<commit_message>
lci mfh 02 example setup
</commit_message>
<xml_diff>
--- a/paper_SI_discussions/Discussion_paper.pptx
+++ b/paper_SI_discussions/Discussion_paper.pptx
@@ -5,7 +5,7 @@
     <p:sldMasterId id="2147483648" r:id="rId1"/>
   </p:sldMasterIdLst>
   <p:notesMasterIdLst>
-    <p:notesMasterId r:id="rId38"/>
+    <p:notesMasterId r:id="rId39"/>
   </p:notesMasterIdLst>
   <p:sldIdLst>
     <p:sldId id="440" r:id="rId2"/>
@@ -13,37 +13,38 @@
     <p:sldId id="515" r:id="rId4"/>
     <p:sldId id="523" r:id="rId5"/>
     <p:sldId id="537" r:id="rId6"/>
-    <p:sldId id="524" r:id="rId7"/>
-    <p:sldId id="536" r:id="rId8"/>
-    <p:sldId id="531" r:id="rId9"/>
-    <p:sldId id="528" r:id="rId10"/>
-    <p:sldId id="526" r:id="rId11"/>
-    <p:sldId id="529" r:id="rId12"/>
-    <p:sldId id="533" r:id="rId13"/>
-    <p:sldId id="534" r:id="rId14"/>
-    <p:sldId id="525" r:id="rId15"/>
-    <p:sldId id="530" r:id="rId16"/>
-    <p:sldId id="516" r:id="rId17"/>
-    <p:sldId id="517" r:id="rId18"/>
-    <p:sldId id="518" r:id="rId19"/>
-    <p:sldId id="519" r:id="rId20"/>
-    <p:sldId id="520" r:id="rId21"/>
-    <p:sldId id="521" r:id="rId22"/>
-    <p:sldId id="522" r:id="rId23"/>
-    <p:sldId id="509" r:id="rId24"/>
-    <p:sldId id="510" r:id="rId25"/>
-    <p:sldId id="511" r:id="rId26"/>
-    <p:sldId id="512" r:id="rId27"/>
-    <p:sldId id="513" r:id="rId28"/>
-    <p:sldId id="497" r:id="rId29"/>
-    <p:sldId id="500" r:id="rId30"/>
-    <p:sldId id="514" r:id="rId31"/>
-    <p:sldId id="505" r:id="rId32"/>
-    <p:sldId id="499" r:id="rId33"/>
-    <p:sldId id="502" r:id="rId34"/>
-    <p:sldId id="503" r:id="rId35"/>
-    <p:sldId id="504" r:id="rId36"/>
-    <p:sldId id="506" r:id="rId37"/>
+    <p:sldId id="538" r:id="rId7"/>
+    <p:sldId id="524" r:id="rId8"/>
+    <p:sldId id="536" r:id="rId9"/>
+    <p:sldId id="531" r:id="rId10"/>
+    <p:sldId id="528" r:id="rId11"/>
+    <p:sldId id="526" r:id="rId12"/>
+    <p:sldId id="529" r:id="rId13"/>
+    <p:sldId id="533" r:id="rId14"/>
+    <p:sldId id="534" r:id="rId15"/>
+    <p:sldId id="525" r:id="rId16"/>
+    <p:sldId id="530" r:id="rId17"/>
+    <p:sldId id="516" r:id="rId18"/>
+    <p:sldId id="517" r:id="rId19"/>
+    <p:sldId id="518" r:id="rId20"/>
+    <p:sldId id="519" r:id="rId21"/>
+    <p:sldId id="520" r:id="rId22"/>
+    <p:sldId id="521" r:id="rId23"/>
+    <p:sldId id="522" r:id="rId24"/>
+    <p:sldId id="509" r:id="rId25"/>
+    <p:sldId id="510" r:id="rId26"/>
+    <p:sldId id="511" r:id="rId27"/>
+    <p:sldId id="512" r:id="rId28"/>
+    <p:sldId id="513" r:id="rId29"/>
+    <p:sldId id="497" r:id="rId30"/>
+    <p:sldId id="500" r:id="rId31"/>
+    <p:sldId id="514" r:id="rId32"/>
+    <p:sldId id="505" r:id="rId33"/>
+    <p:sldId id="499" r:id="rId34"/>
+    <p:sldId id="502" r:id="rId35"/>
+    <p:sldId id="503" r:id="rId36"/>
+    <p:sldId id="504" r:id="rId37"/>
+    <p:sldId id="506" r:id="rId38"/>
   </p:sldIdLst>
   <p:sldSz cx="9144000" cy="6858000" type="screen4x3"/>
   <p:notesSz cx="6794500" cy="9931400"/>
@@ -156,6 +157,7 @@
             <p14:sldId id="515"/>
             <p14:sldId id="523"/>
             <p14:sldId id="537"/>
+            <p14:sldId id="538"/>
           </p14:sldIdLst>
         </p14:section>
         <p14:section name="070123" id="{88BC7959-5355-492C-9DE9-19C2A735791E}">
@@ -7400,7 +7402,7 @@
           <a:p>
             <a:fld id="{A51C0C35-A9A2-4EFD-9BAF-1E52E29E03D1}" type="slidenum">
               <a:rPr lang="de-CH" smtClean="0"/>
-              <a:t>9</a:t>
+              <a:t>10</a:t>
             </a:fld>
             <a:endParaRPr lang="de-CH"/>
           </a:p>
@@ -10986,40 +10988,73 @@
           <a:p>
             <a:r>
               <a:rPr lang="en-US" dirty="0" smtClean="0"/>
-              <a:t>2. Embodied : components (Example building)</a:t>
+              <a:t>1. Overall LCA - Embodied and </a:t>
             </a:r>
-            <a:endParaRPr lang="en-US" dirty="0"/>
+            <a:r>
+              <a:rPr lang="en-US" dirty="0"/>
+              <a:t>operational (Example building)</a:t>
+            </a:r>
           </a:p>
         </p:txBody>
       </p:sp>
       <p:graphicFrame>
         <p:nvGraphicFramePr>
-          <p:cNvPr id="9" name="Chart 8"/>
+          <p:cNvPr id="10" name="Chart 9"/>
           <p:cNvGraphicFramePr>
             <a:graphicFrameLocks/>
           </p:cNvGraphicFramePr>
           <p:nvPr>
             <p:extLst>
               <p:ext uri="{D42A27DB-BD31-4B8C-83A1-F6EECF244321}">
-                <p14:modId xmlns:p14="http://schemas.microsoft.com/office/powerpoint/2010/main" val="603343493"/>
+                <p14:modId xmlns:p14="http://schemas.microsoft.com/office/powerpoint/2010/main" val="1547022581"/>
               </p:ext>
             </p:extLst>
           </p:nvPr>
         </p:nvGraphicFramePr>
         <p:xfrm>
-          <a:off x="1198685" y="2118213"/>
-          <a:ext cx="6324600" cy="3981450"/>
+          <a:off x="521678" y="2057399"/>
+          <a:ext cx="8104674" cy="3399693"/>
         </p:xfrm>
         <a:graphic>
           <a:graphicData uri="http://schemas.openxmlformats.org/drawingml/2006/chart">
-            <c:chart xmlns:c="http://schemas.openxmlformats.org/drawingml/2006/chart" xmlns:r="http://schemas.openxmlformats.org/officeDocument/2006/relationships" r:id="rId2"/>
+            <c:chart xmlns:c="http://schemas.openxmlformats.org/drawingml/2006/chart" xmlns:r="http://schemas.openxmlformats.org/officeDocument/2006/relationships" r:id="rId3"/>
           </a:graphicData>
         </a:graphic>
       </p:graphicFrame>
+      <p:sp>
+        <p:nvSpPr>
+          <p:cNvPr id="11" name="TextBox 10"/>
+          <p:cNvSpPr txBox="1"/>
+          <p:nvPr/>
+        </p:nvSpPr>
+        <p:spPr>
+          <a:xfrm>
+            <a:off x="2702169" y="5726723"/>
+            <a:ext cx="4185761" cy="369332"/>
+          </a:xfrm>
+          <a:prstGeom prst="rect">
+            <a:avLst/>
+          </a:prstGeom>
+          <a:noFill/>
+        </p:spPr>
+        <p:txBody>
+          <a:bodyPr wrap="none" rtlCol="0">
+            <a:spAutoFit/>
+          </a:bodyPr>
+          <a:lstStyle/>
+          <a:p>
+            <a:r>
+              <a:rPr lang="en-US" i="1" dirty="0" smtClean="0"/>
+              <a:t>Results on paper will show all buildings</a:t>
+            </a:r>
+            <a:endParaRPr lang="en-US" i="1" dirty="0"/>
+          </a:p>
+        </p:txBody>
+      </p:sp>
     </p:spTree>
     <p:extLst>
       <p:ext uri="{BB962C8B-B14F-4D97-AF65-F5344CB8AC3E}">
-        <p14:creationId xmlns:p14="http://schemas.microsoft.com/office/powerpoint/2010/main" val="2023348121"/>
+        <p14:creationId xmlns:p14="http://schemas.microsoft.com/office/powerpoint/2010/main" val="4030856589"/>
       </p:ext>
     </p:extLst>
   </p:cSld>
@@ -11051,6 +11086,155 @@
       </p:grpSpPr>
       <p:sp>
         <p:nvSpPr>
+          <p:cNvPr id="3" name="Date Placeholder 2"/>
+          <p:cNvSpPr>
+            <a:spLocks noGrp="1"/>
+          </p:cNvSpPr>
+          <p:nvPr>
+            <p:ph type="dt" sz="half" idx="10"/>
+          </p:nvPr>
+        </p:nvSpPr>
+        <p:spPr/>
+        <p:txBody>
+          <a:bodyPr/>
+          <a:lstStyle/>
+          <a:p>
+            <a:fld id="{FF15E650-2C9B-4E22-B544-79A90AB3DDC1}" type="datetime1">
+              <a:rPr lang="de-DE" smtClean="0"/>
+              <a:t>16.01.2023</a:t>
+            </a:fld>
+            <a:endParaRPr lang="de-DE"/>
+          </a:p>
+        </p:txBody>
+      </p:sp>
+      <p:sp>
+        <p:nvSpPr>
+          <p:cNvPr id="4" name="Footer Placeholder 3"/>
+          <p:cNvSpPr>
+            <a:spLocks noGrp="1"/>
+          </p:cNvSpPr>
+          <p:nvPr>
+            <p:ph type="ftr" sz="quarter" idx="11"/>
+          </p:nvPr>
+        </p:nvSpPr>
+        <p:spPr/>
+        <p:txBody>
+          <a:bodyPr/>
+          <a:lstStyle/>
+          <a:p>
+            <a:r>
+              <a:rPr lang="de-DE" smtClean="0"/>
+              <a:t>Shinde, Rhythima</a:t>
+            </a:r>
+            <a:endParaRPr lang="de-DE"/>
+          </a:p>
+        </p:txBody>
+      </p:sp>
+      <p:sp>
+        <p:nvSpPr>
+          <p:cNvPr id="5" name="Slide Number Placeholder 4"/>
+          <p:cNvSpPr>
+            <a:spLocks noGrp="1"/>
+          </p:cNvSpPr>
+          <p:nvPr>
+            <p:ph type="sldNum" sz="quarter" idx="12"/>
+          </p:nvPr>
+        </p:nvSpPr>
+        <p:spPr/>
+        <p:txBody>
+          <a:bodyPr/>
+          <a:lstStyle/>
+          <a:p>
+            <a:fld id="{6C6AE60A-B69C-4790-82F7-3882EDF23186}" type="slidenum">
+              <a:rPr lang="de-DE" smtClean="0"/>
+              <a:t>11</a:t>
+            </a:fld>
+            <a:endParaRPr lang="de-DE"/>
+          </a:p>
+        </p:txBody>
+      </p:sp>
+      <p:sp>
+        <p:nvSpPr>
+          <p:cNvPr id="6" name="Title 5"/>
+          <p:cNvSpPr>
+            <a:spLocks noGrp="1"/>
+          </p:cNvSpPr>
+          <p:nvPr>
+            <p:ph type="title"/>
+          </p:nvPr>
+        </p:nvSpPr>
+        <p:spPr/>
+        <p:txBody>
+          <a:bodyPr/>
+          <a:lstStyle/>
+          <a:p>
+            <a:r>
+              <a:rPr lang="en-US" dirty="0" smtClean="0"/>
+              <a:t>2. Embodied : components (Example building)</a:t>
+            </a:r>
+            <a:endParaRPr lang="en-US" dirty="0"/>
+          </a:p>
+        </p:txBody>
+      </p:sp>
+      <p:graphicFrame>
+        <p:nvGraphicFramePr>
+          <p:cNvPr id="9" name="Chart 8"/>
+          <p:cNvGraphicFramePr>
+            <a:graphicFrameLocks/>
+          </p:cNvGraphicFramePr>
+          <p:nvPr>
+            <p:extLst>
+              <p:ext uri="{D42A27DB-BD31-4B8C-83A1-F6EECF244321}">
+                <p14:modId xmlns:p14="http://schemas.microsoft.com/office/powerpoint/2010/main" val="603343493"/>
+              </p:ext>
+            </p:extLst>
+          </p:nvPr>
+        </p:nvGraphicFramePr>
+        <p:xfrm>
+          <a:off x="1198685" y="2118213"/>
+          <a:ext cx="6324600" cy="3981450"/>
+        </p:xfrm>
+        <a:graphic>
+          <a:graphicData uri="http://schemas.openxmlformats.org/drawingml/2006/chart">
+            <c:chart xmlns:c="http://schemas.openxmlformats.org/drawingml/2006/chart" xmlns:r="http://schemas.openxmlformats.org/officeDocument/2006/relationships" r:id="rId2"/>
+          </a:graphicData>
+        </a:graphic>
+      </p:graphicFrame>
+    </p:spTree>
+    <p:extLst>
+      <p:ext uri="{BB962C8B-B14F-4D97-AF65-F5344CB8AC3E}">
+        <p14:creationId xmlns:p14="http://schemas.microsoft.com/office/powerpoint/2010/main" val="2023348121"/>
+      </p:ext>
+    </p:extLst>
+  </p:cSld>
+  <p:clrMapOvr>
+    <a:masterClrMapping/>
+  </p:clrMapOvr>
+  <p:transition>
+    <p:fade/>
+  </p:transition>
+</p:sld>
+</file>
+
+<file path=ppt/slides/slide12.xml><?xml version="1.0" encoding="utf-8"?>
+<p:sld xmlns:a="http://schemas.openxmlformats.org/drawingml/2006/main" xmlns:r="http://schemas.openxmlformats.org/officeDocument/2006/relationships" xmlns:p="http://schemas.openxmlformats.org/presentationml/2006/main">
+  <p:cSld>
+    <p:spTree>
+      <p:nvGrpSpPr>
+        <p:cNvPr id="1" name=""/>
+        <p:cNvGrpSpPr/>
+        <p:nvPr/>
+      </p:nvGrpSpPr>
+      <p:grpSpPr>
+        <a:xfrm>
+          <a:off x="0" y="0"/>
+          <a:ext cx="0" cy="0"/>
+          <a:chOff x="0" y="0"/>
+          <a:chExt cx="0" cy="0"/>
+        </a:xfrm>
+      </p:grpSpPr>
+      <p:sp>
+        <p:nvSpPr>
           <p:cNvPr id="2" name="Content Placeholder 1"/>
           <p:cNvSpPr>
             <a:spLocks noGrp="1"/>
@@ -11161,7 +11345,7 @@
           <a:p>
             <a:fld id="{6C6AE60A-B69C-4790-82F7-3882EDF23186}" type="slidenum">
               <a:rPr lang="de-DE" smtClean="0"/>
-              <a:t>11</a:t>
+              <a:t>12</a:t>
             </a:fld>
             <a:endParaRPr lang="de-DE"/>
           </a:p>
@@ -11230,7 +11414,7 @@
 </p:sld>
 </file>
 
-<file path=ppt/slides/slide12.xml><?xml version="1.0" encoding="utf-8"?>
+<file path=ppt/slides/slide13.xml><?xml version="1.0" encoding="utf-8"?>
 <p:sld xmlns:a="http://schemas.openxmlformats.org/drawingml/2006/main" xmlns:r="http://schemas.openxmlformats.org/officeDocument/2006/relationships" xmlns:p="http://schemas.openxmlformats.org/presentationml/2006/main">
   <p:cSld>
     <p:spTree>
@@ -11310,7 +11494,7 @@
           <a:p>
             <a:fld id="{6C6AE60A-B69C-4790-82F7-3882EDF23186}" type="slidenum">
               <a:rPr lang="de-DE" smtClean="0"/>
-              <a:t>12</a:t>
+              <a:t>13</a:t>
             </a:fld>
             <a:endParaRPr lang="de-DE"/>
           </a:p>
@@ -11624,7 +11808,7 @@
 </p:sld>
 </file>
 
-<file path=ppt/slides/slide13.xml><?xml version="1.0" encoding="utf-8"?>
+<file path=ppt/slides/slide14.xml><?xml version="1.0" encoding="utf-8"?>
 <p:sld xmlns:a="http://schemas.openxmlformats.org/drawingml/2006/main" xmlns:r="http://schemas.openxmlformats.org/officeDocument/2006/relationships" xmlns:p="http://schemas.openxmlformats.org/presentationml/2006/main">
   <p:cSld>
     <p:spTree>
@@ -11727,7 +11911,7 @@
           <a:p>
             <a:fld id="{6C6AE60A-B69C-4790-82F7-3882EDF23186}" type="slidenum">
               <a:rPr lang="de-DE" smtClean="0"/>
-              <a:t>13</a:t>
+              <a:t>14</a:t>
             </a:fld>
             <a:endParaRPr lang="de-DE"/>
           </a:p>
@@ -11845,156 +12029,6 @@
 </p:sld>
 </file>
 
-<file path=ppt/slides/slide14.xml><?xml version="1.0" encoding="utf-8"?>
-<p:sld xmlns:a="http://schemas.openxmlformats.org/drawingml/2006/main" xmlns:r="http://schemas.openxmlformats.org/officeDocument/2006/relationships" xmlns:p="http://schemas.openxmlformats.org/presentationml/2006/main">
-  <p:cSld>
-    <p:spTree>
-      <p:nvGrpSpPr>
-        <p:cNvPr id="1" name=""/>
-        <p:cNvGrpSpPr/>
-        <p:nvPr/>
-      </p:nvGrpSpPr>
-      <p:grpSpPr>
-        <a:xfrm>
-          <a:off x="0" y="0"/>
-          <a:ext cx="0" cy="0"/>
-          <a:chOff x="0" y="0"/>
-          <a:chExt cx="0" cy="0"/>
-        </a:xfrm>
-      </p:grpSpPr>
-      <p:sp>
-        <p:nvSpPr>
-          <p:cNvPr id="3" name="Date Placeholder 2"/>
-          <p:cNvSpPr>
-            <a:spLocks noGrp="1"/>
-          </p:cNvSpPr>
-          <p:nvPr>
-            <p:ph type="dt" sz="half" idx="10"/>
-          </p:nvPr>
-        </p:nvSpPr>
-        <p:spPr/>
-        <p:txBody>
-          <a:bodyPr/>
-          <a:lstStyle/>
-          <a:p>
-            <a:fld id="{FF15E650-2C9B-4E22-B544-79A90AB3DDC1}" type="datetime1">
-              <a:rPr lang="de-DE" smtClean="0"/>
-              <a:t>16.01.2023</a:t>
-            </a:fld>
-            <a:endParaRPr lang="de-DE"/>
-          </a:p>
-        </p:txBody>
-      </p:sp>
-      <p:sp>
-        <p:nvSpPr>
-          <p:cNvPr id="4" name="Footer Placeholder 3"/>
-          <p:cNvSpPr>
-            <a:spLocks noGrp="1"/>
-          </p:cNvSpPr>
-          <p:nvPr>
-            <p:ph type="ftr" sz="quarter" idx="11"/>
-          </p:nvPr>
-        </p:nvSpPr>
-        <p:spPr/>
-        <p:txBody>
-          <a:bodyPr/>
-          <a:lstStyle/>
-          <a:p>
-            <a:r>
-              <a:rPr lang="de-DE" smtClean="0"/>
-              <a:t>Shinde, Rhythima</a:t>
-            </a:r>
-            <a:endParaRPr lang="de-DE"/>
-          </a:p>
-        </p:txBody>
-      </p:sp>
-      <p:sp>
-        <p:nvSpPr>
-          <p:cNvPr id="5" name="Slide Number Placeholder 4"/>
-          <p:cNvSpPr>
-            <a:spLocks noGrp="1"/>
-          </p:cNvSpPr>
-          <p:nvPr>
-            <p:ph type="sldNum" sz="quarter" idx="12"/>
-          </p:nvPr>
-        </p:nvSpPr>
-        <p:spPr/>
-        <p:txBody>
-          <a:bodyPr/>
-          <a:lstStyle/>
-          <a:p>
-            <a:fld id="{6C6AE60A-B69C-4790-82F7-3882EDF23186}" type="slidenum">
-              <a:rPr lang="de-DE" smtClean="0"/>
-              <a:t>14</a:t>
-            </a:fld>
-            <a:endParaRPr lang="de-DE"/>
-          </a:p>
-        </p:txBody>
-      </p:sp>
-      <p:sp>
-        <p:nvSpPr>
-          <p:cNvPr id="6" name="Title 5"/>
-          <p:cNvSpPr>
-            <a:spLocks noGrp="1"/>
-          </p:cNvSpPr>
-          <p:nvPr>
-            <p:ph type="title"/>
-          </p:nvPr>
-        </p:nvSpPr>
-        <p:spPr/>
-        <p:txBody>
-          <a:bodyPr/>
-          <a:lstStyle/>
-          <a:p>
-            <a:r>
-              <a:rPr lang="en-US" dirty="0" smtClean="0"/>
-              <a:t>3. Operational emissions : space heating + ventilation + hot water</a:t>
-            </a:r>
-            <a:endParaRPr lang="en-US" dirty="0"/>
-          </a:p>
-        </p:txBody>
-      </p:sp>
-      <p:graphicFrame>
-        <p:nvGraphicFramePr>
-          <p:cNvPr id="8" name="Content Placeholder 7"/>
-          <p:cNvGraphicFramePr>
-            <a:graphicFrameLocks noGrp="1"/>
-          </p:cNvGraphicFramePr>
-          <p:nvPr>
-            <p:ph idx="1"/>
-            <p:extLst>
-              <p:ext uri="{D42A27DB-BD31-4B8C-83A1-F6EECF244321}">
-                <p14:modId xmlns:p14="http://schemas.microsoft.com/office/powerpoint/2010/main" val="3160185675"/>
-              </p:ext>
-            </p:extLst>
-          </p:nvPr>
-        </p:nvGraphicFramePr>
-        <p:xfrm>
-          <a:off x="323850" y="2024063"/>
-          <a:ext cx="8496300" cy="4210050"/>
-        </p:xfrm>
-        <a:graphic>
-          <a:graphicData uri="http://schemas.openxmlformats.org/drawingml/2006/chart">
-            <c:chart xmlns:c="http://schemas.openxmlformats.org/drawingml/2006/chart" xmlns:r="http://schemas.openxmlformats.org/officeDocument/2006/relationships" r:id="rId2"/>
-          </a:graphicData>
-        </a:graphic>
-      </p:graphicFrame>
-    </p:spTree>
-    <p:extLst>
-      <p:ext uri="{BB962C8B-B14F-4D97-AF65-F5344CB8AC3E}">
-        <p14:creationId xmlns:p14="http://schemas.microsoft.com/office/powerpoint/2010/main" val="4133344821"/>
-      </p:ext>
-    </p:extLst>
-  </p:cSld>
-  <p:clrMapOvr>
-    <a:masterClrMapping/>
-  </p:clrMapOvr>
-  <p:transition>
-    <p:fade/>
-  </p:transition>
-</p:sld>
-</file>
-
 <file path=ppt/slides/slide15.xml><?xml version="1.0" encoding="utf-8"?>
 <p:sld xmlns:a="http://schemas.openxmlformats.org/drawingml/2006/main" xmlns:r="http://schemas.openxmlformats.org/officeDocument/2006/relationships" xmlns:p="http://schemas.openxmlformats.org/presentationml/2006/main">
   <p:cSld>
@@ -12098,22 +12132,7 @@
           <a:p>
             <a:r>
               <a:rPr lang="en-US" dirty="0" smtClean="0"/>
-              <a:t>3. Operational</a:t>
-            </a:r>
-            <a:r>
-              <a:rPr lang="en-US" dirty="0"/>
-              <a:t> </a:t>
-            </a:r>
-            <a:r>
-              <a:rPr lang="en-US" dirty="0" smtClean="0"/>
-              <a:t>: all components </a:t>
-            </a:r>
-            <a:br>
-              <a:rPr lang="en-US" dirty="0" smtClean="0"/>
-            </a:br>
-            <a:r>
-              <a:rPr lang="en-US" dirty="0" smtClean="0"/>
-              <a:t>(example building)</a:t>
+              <a:t>3. Operational emissions : space heating + ventilation + hot water</a:t>
             </a:r>
             <a:endParaRPr lang="en-US" dirty="0"/>
           </a:p>
@@ -12121,21 +12140,22 @@
       </p:sp>
       <p:graphicFrame>
         <p:nvGraphicFramePr>
-          <p:cNvPr id="8" name="Chart 7"/>
+          <p:cNvPr id="8" name="Content Placeholder 7"/>
           <p:cNvGraphicFramePr>
-            <a:graphicFrameLocks/>
+            <a:graphicFrameLocks noGrp="1"/>
           </p:cNvGraphicFramePr>
           <p:nvPr>
+            <p:ph idx="1"/>
             <p:extLst>
               <p:ext uri="{D42A27DB-BD31-4B8C-83A1-F6EECF244321}">
-                <p14:modId xmlns:p14="http://schemas.microsoft.com/office/powerpoint/2010/main" val="321563292"/>
+                <p14:modId xmlns:p14="http://schemas.microsoft.com/office/powerpoint/2010/main" val="3160185675"/>
               </p:ext>
             </p:extLst>
           </p:nvPr>
         </p:nvGraphicFramePr>
         <p:xfrm>
-          <a:off x="1409700" y="2080846"/>
-          <a:ext cx="5665177" cy="3634153"/>
+          <a:off x="323850" y="2024063"/>
+          <a:ext cx="8496300" cy="4210050"/>
         </p:xfrm>
         <a:graphic>
           <a:graphicData uri="http://schemas.openxmlformats.org/drawingml/2006/chart">
@@ -12146,7 +12166,7 @@
     </p:spTree>
     <p:extLst>
       <p:ext uri="{BB962C8B-B14F-4D97-AF65-F5344CB8AC3E}">
-        <p14:creationId xmlns:p14="http://schemas.microsoft.com/office/powerpoint/2010/main" val="2402256300"/>
+        <p14:creationId xmlns:p14="http://schemas.microsoft.com/office/powerpoint/2010/main" val="4133344821"/>
       </p:ext>
     </p:extLst>
   </p:cSld>
@@ -12178,42 +12198,6 @@
       </p:grpSpPr>
       <p:sp>
         <p:nvSpPr>
-          <p:cNvPr id="2" name="Content Placeholder 1"/>
-          <p:cNvSpPr>
-            <a:spLocks noGrp="1"/>
-          </p:cNvSpPr>
-          <p:nvPr>
-            <p:ph idx="1"/>
-          </p:nvPr>
-        </p:nvSpPr>
-        <p:spPr/>
-        <p:txBody>
-          <a:bodyPr/>
-          <a:lstStyle/>
-          <a:p>
-            <a:r>
-              <a:rPr lang="en-US" dirty="0" smtClean="0"/>
-              <a:t>Figure 1 + Table 1 </a:t>
-            </a:r>
-          </a:p>
-          <a:p>
-            <a:pPr lvl="1"/>
-            <a:r>
-              <a:rPr lang="en-US" dirty="0" smtClean="0"/>
-              <a:t>Dimensions of building components </a:t>
-            </a:r>
-          </a:p>
-          <a:p>
-            <a:r>
-              <a:rPr lang="en-US" dirty="0" smtClean="0"/>
-              <a:t>Ventilation data and updates </a:t>
-            </a:r>
-            <a:endParaRPr lang="en-US" dirty="0"/>
-          </a:p>
-        </p:txBody>
-      </p:sp>
-      <p:sp>
-        <p:nvSpPr>
           <p:cNvPr id="3" name="Date Placeholder 2"/>
           <p:cNvSpPr>
             <a:spLocks noGrp="1"/>
@@ -12298,16 +12282,55 @@
           <a:p>
             <a:r>
               <a:rPr lang="en-US" dirty="0" smtClean="0"/>
-              <a:t>Comments Section 2-4</a:t>
+              <a:t>3. Operational</a:t>
+            </a:r>
+            <a:r>
+              <a:rPr lang="en-US" dirty="0"/>
+              <a:t> </a:t>
+            </a:r>
+            <a:r>
+              <a:rPr lang="en-US" dirty="0" smtClean="0"/>
+              <a:t>: all components </a:t>
+            </a:r>
+            <a:br>
+              <a:rPr lang="en-US" dirty="0" smtClean="0"/>
+            </a:br>
+            <a:r>
+              <a:rPr lang="en-US" dirty="0" smtClean="0"/>
+              <a:t>(example building)</a:t>
             </a:r>
             <a:endParaRPr lang="en-US" dirty="0"/>
           </a:p>
         </p:txBody>
       </p:sp>
+      <p:graphicFrame>
+        <p:nvGraphicFramePr>
+          <p:cNvPr id="8" name="Chart 7"/>
+          <p:cNvGraphicFramePr>
+            <a:graphicFrameLocks/>
+          </p:cNvGraphicFramePr>
+          <p:nvPr>
+            <p:extLst>
+              <p:ext uri="{D42A27DB-BD31-4B8C-83A1-F6EECF244321}">
+                <p14:modId xmlns:p14="http://schemas.microsoft.com/office/powerpoint/2010/main" val="321563292"/>
+              </p:ext>
+            </p:extLst>
+          </p:nvPr>
+        </p:nvGraphicFramePr>
+        <p:xfrm>
+          <a:off x="1409700" y="2080846"/>
+          <a:ext cx="5665177" cy="3634153"/>
+        </p:xfrm>
+        <a:graphic>
+          <a:graphicData uri="http://schemas.openxmlformats.org/drawingml/2006/chart">
+            <c:chart xmlns:c="http://schemas.openxmlformats.org/drawingml/2006/chart" xmlns:r="http://schemas.openxmlformats.org/officeDocument/2006/relationships" r:id="rId2"/>
+          </a:graphicData>
+        </a:graphic>
+      </p:graphicFrame>
     </p:spTree>
     <p:extLst>
       <p:ext uri="{BB962C8B-B14F-4D97-AF65-F5344CB8AC3E}">
-        <p14:creationId xmlns:p14="http://schemas.microsoft.com/office/powerpoint/2010/main" val="565144384"/>
+        <p14:creationId xmlns:p14="http://schemas.microsoft.com/office/powerpoint/2010/main" val="2402256300"/>
       </p:ext>
     </p:extLst>
   </p:cSld>
@@ -12354,33 +12377,20 @@
           <a:p>
             <a:r>
               <a:rPr lang="en-US" dirty="0" smtClean="0"/>
-              <a:t>Internal walls removed </a:t>
-            </a:r>
-          </a:p>
-          <a:p>
-            <a:r>
-              <a:rPr lang="en-US" dirty="0" smtClean="0"/>
-              <a:t>U Values rechecked</a:t>
+              <a:t>Figure 1 + Table 1 </a:t>
             </a:r>
           </a:p>
           <a:p>
             <a:pPr lvl="1"/>
             <a:r>
               <a:rPr lang="en-US" dirty="0" smtClean="0"/>
-              <a:t>Some large values for buildings estimated with high space heating demands</a:t>
+              <a:t>Dimensions of building components </a:t>
             </a:r>
           </a:p>
           <a:p>
-            <a:pPr lvl="1"/>
             <a:r>
               <a:rPr lang="en-US" dirty="0" smtClean="0"/>
-              <a:t>Rechecked for the given values vs calculated – which one to use? </a:t>
-            </a:r>
-          </a:p>
-          <a:p>
-            <a:r>
-              <a:rPr lang="en-US" dirty="0" smtClean="0"/>
-              <a:t>U Values windows updates</a:t>
+              <a:t>Ventilation data and updates </a:t>
             </a:r>
             <a:endParaRPr lang="en-US" dirty="0"/>
           </a:p>
@@ -12472,7 +12482,7 @@
           <a:p>
             <a:r>
               <a:rPr lang="en-US" dirty="0" smtClean="0"/>
-              <a:t>U values results</a:t>
+              <a:t>Comments Section 2-4</a:t>
             </a:r>
             <a:endParaRPr lang="en-US" dirty="0"/>
           </a:p>
@@ -12481,7 +12491,7 @@
     </p:spTree>
     <p:extLst>
       <p:ext uri="{BB962C8B-B14F-4D97-AF65-F5344CB8AC3E}">
-        <p14:creationId xmlns:p14="http://schemas.microsoft.com/office/powerpoint/2010/main" val="1024277250"/>
+        <p14:creationId xmlns:p14="http://schemas.microsoft.com/office/powerpoint/2010/main" val="565144384"/>
       </p:ext>
     </p:extLst>
   </p:cSld>
@@ -12528,27 +12538,33 @@
           <a:p>
             <a:r>
               <a:rPr lang="en-US" dirty="0" smtClean="0"/>
-              <a:t>All results presented </a:t>
+              <a:t>Internal walls removed </a:t>
             </a:r>
           </a:p>
           <a:p>
             <a:r>
               <a:rPr lang="en-US" dirty="0" smtClean="0"/>
-              <a:t>Significant p values shown for given </a:t>
+              <a:t>U Values rechecked</a:t>
             </a:r>
           </a:p>
           <a:p>
+            <a:pPr lvl="1"/>
             <a:r>
               <a:rPr lang="en-US" dirty="0" smtClean="0"/>
-              <a:t>Same p values against </a:t>
+              <a:t>Some large values for buildings estimated with high space heating demands</a:t>
             </a:r>
-            <a:r>
-              <a:rPr lang="en-US" dirty="0" err="1" smtClean="0"/>
-              <a:t>buffat</a:t>
-            </a:r>
+          </a:p>
+          <a:p>
+            <a:pPr lvl="1"/>
             <a:r>
               <a:rPr lang="en-US" dirty="0" smtClean="0"/>
-              <a:t> </a:t>
+              <a:t>Rechecked for the given values vs calculated – which one to use? </a:t>
+            </a:r>
+          </a:p>
+          <a:p>
+            <a:r>
+              <a:rPr lang="en-US" dirty="0" smtClean="0"/>
+              <a:t>U Values windows updates</a:t>
             </a:r>
             <a:endParaRPr lang="en-US" dirty="0"/>
           </a:p>
@@ -12640,7 +12656,7 @@
           <a:p>
             <a:r>
               <a:rPr lang="en-US" dirty="0" smtClean="0"/>
-              <a:t>U Values writings</a:t>
+              <a:t>U values results</a:t>
             </a:r>
             <a:endParaRPr lang="en-US" dirty="0"/>
           </a:p>
@@ -12649,7 +12665,7 @@
     </p:spTree>
     <p:extLst>
       <p:ext uri="{BB962C8B-B14F-4D97-AF65-F5344CB8AC3E}">
-        <p14:creationId xmlns:p14="http://schemas.microsoft.com/office/powerpoint/2010/main" val="2629382120"/>
+        <p14:creationId xmlns:p14="http://schemas.microsoft.com/office/powerpoint/2010/main" val="1024277250"/>
       </p:ext>
     </p:extLst>
   </p:cSld>
@@ -12694,7 +12710,31 @@
           <a:bodyPr/>
           <a:lstStyle/>
           <a:p>
-            <a:endParaRPr lang="en-US"/>
+            <a:r>
+              <a:rPr lang="en-US" dirty="0" smtClean="0"/>
+              <a:t>All results presented </a:t>
+            </a:r>
+          </a:p>
+          <a:p>
+            <a:r>
+              <a:rPr lang="en-US" dirty="0" smtClean="0"/>
+              <a:t>Significant p values shown for given </a:t>
+            </a:r>
+          </a:p>
+          <a:p>
+            <a:r>
+              <a:rPr lang="en-US" dirty="0" smtClean="0"/>
+              <a:t>Same p values against </a:t>
+            </a:r>
+            <a:r>
+              <a:rPr lang="en-US" dirty="0" err="1" smtClean="0"/>
+              <a:t>buffat</a:t>
+            </a:r>
+            <a:r>
+              <a:rPr lang="en-US" dirty="0" smtClean="0"/>
+              <a:t> </a:t>
+            </a:r>
+            <a:endParaRPr lang="en-US" dirty="0"/>
           </a:p>
         </p:txBody>
       </p:sp>
@@ -12784,7 +12824,7 @@
           <a:p>
             <a:r>
               <a:rPr lang="en-US" dirty="0" smtClean="0"/>
-              <a:t>Heat demand results </a:t>
+              <a:t>U Values writings</a:t>
             </a:r>
             <a:endParaRPr lang="en-US" dirty="0"/>
           </a:p>
@@ -12793,7 +12833,7 @@
     </p:spTree>
     <p:extLst>
       <p:ext uri="{BB962C8B-B14F-4D97-AF65-F5344CB8AC3E}">
-        <p14:creationId xmlns:p14="http://schemas.microsoft.com/office/powerpoint/2010/main" val="1444110928"/>
+        <p14:creationId xmlns:p14="http://schemas.microsoft.com/office/powerpoint/2010/main" val="2629382120"/>
       </p:ext>
     </p:extLst>
   </p:cSld>
@@ -14334,7 +14374,7 @@
           <a:p>
             <a:r>
               <a:rPr lang="en-US" dirty="0" smtClean="0"/>
-              <a:t>Heat demand writings</a:t>
+              <a:t>Heat demand results </a:t>
             </a:r>
             <a:endParaRPr lang="en-US" dirty="0"/>
           </a:p>
@@ -14343,7 +14383,7 @@
     </p:spTree>
     <p:extLst>
       <p:ext uri="{BB962C8B-B14F-4D97-AF65-F5344CB8AC3E}">
-        <p14:creationId xmlns:p14="http://schemas.microsoft.com/office/powerpoint/2010/main" val="296182105"/>
+        <p14:creationId xmlns:p14="http://schemas.microsoft.com/office/powerpoint/2010/main" val="1444110928"/>
       </p:ext>
     </p:extLst>
   </p:cSld>
@@ -14478,7 +14518,7 @@
           <a:p>
             <a:r>
               <a:rPr lang="en-US" dirty="0" smtClean="0"/>
-              <a:t>LCA results</a:t>
+              <a:t>Heat demand writings</a:t>
             </a:r>
             <a:endParaRPr lang="en-US" dirty="0"/>
           </a:p>
@@ -14487,7 +14527,7 @@
     </p:spTree>
     <p:extLst>
       <p:ext uri="{BB962C8B-B14F-4D97-AF65-F5344CB8AC3E}">
-        <p14:creationId xmlns:p14="http://schemas.microsoft.com/office/powerpoint/2010/main" val="1406383392"/>
+        <p14:creationId xmlns:p14="http://schemas.microsoft.com/office/powerpoint/2010/main" val="296182105"/>
       </p:ext>
     </p:extLst>
   </p:cSld>
@@ -14622,7 +14662,7 @@
           <a:p>
             <a:r>
               <a:rPr lang="en-US" dirty="0" smtClean="0"/>
-              <a:t>LCA writings</a:t>
+              <a:t>LCA results</a:t>
             </a:r>
             <a:endParaRPr lang="en-US" dirty="0"/>
           </a:p>
@@ -14631,7 +14671,7 @@
     </p:spTree>
     <p:extLst>
       <p:ext uri="{BB962C8B-B14F-4D97-AF65-F5344CB8AC3E}">
-        <p14:creationId xmlns:p14="http://schemas.microsoft.com/office/powerpoint/2010/main" val="3052739354"/>
+        <p14:creationId xmlns:p14="http://schemas.microsoft.com/office/powerpoint/2010/main" val="1406383392"/>
       </p:ext>
     </p:extLst>
   </p:cSld>
@@ -14676,6 +14716,150 @@
           <a:bodyPr/>
           <a:lstStyle/>
           <a:p>
+            <a:endParaRPr lang="en-US"/>
+          </a:p>
+        </p:txBody>
+      </p:sp>
+      <p:sp>
+        <p:nvSpPr>
+          <p:cNvPr id="3" name="Date Placeholder 2"/>
+          <p:cNvSpPr>
+            <a:spLocks noGrp="1"/>
+          </p:cNvSpPr>
+          <p:nvPr>
+            <p:ph type="dt" sz="half" idx="10"/>
+          </p:nvPr>
+        </p:nvSpPr>
+        <p:spPr/>
+        <p:txBody>
+          <a:bodyPr/>
+          <a:lstStyle/>
+          <a:p>
+            <a:fld id="{FF15E650-2C9B-4E22-B544-79A90AB3DDC1}" type="datetime1">
+              <a:rPr lang="de-DE" smtClean="0"/>
+              <a:t>16.01.2023</a:t>
+            </a:fld>
+            <a:endParaRPr lang="de-DE"/>
+          </a:p>
+        </p:txBody>
+      </p:sp>
+      <p:sp>
+        <p:nvSpPr>
+          <p:cNvPr id="4" name="Footer Placeholder 3"/>
+          <p:cNvSpPr>
+            <a:spLocks noGrp="1"/>
+          </p:cNvSpPr>
+          <p:nvPr>
+            <p:ph type="ftr" sz="quarter" idx="11"/>
+          </p:nvPr>
+        </p:nvSpPr>
+        <p:spPr/>
+        <p:txBody>
+          <a:bodyPr/>
+          <a:lstStyle/>
+          <a:p>
+            <a:r>
+              <a:rPr lang="de-DE" smtClean="0"/>
+              <a:t>Shinde, Rhythima</a:t>
+            </a:r>
+            <a:endParaRPr lang="de-DE"/>
+          </a:p>
+        </p:txBody>
+      </p:sp>
+      <p:sp>
+        <p:nvSpPr>
+          <p:cNvPr id="5" name="Slide Number Placeholder 4"/>
+          <p:cNvSpPr>
+            <a:spLocks noGrp="1"/>
+          </p:cNvSpPr>
+          <p:nvPr>
+            <p:ph type="sldNum" sz="quarter" idx="12"/>
+          </p:nvPr>
+        </p:nvSpPr>
+        <p:spPr/>
+        <p:txBody>
+          <a:bodyPr/>
+          <a:lstStyle/>
+          <a:p>
+            <a:fld id="{6C6AE60A-B69C-4790-82F7-3882EDF23186}" type="slidenum">
+              <a:rPr lang="de-DE" smtClean="0"/>
+              <a:t>23</a:t>
+            </a:fld>
+            <a:endParaRPr lang="de-DE"/>
+          </a:p>
+        </p:txBody>
+      </p:sp>
+      <p:sp>
+        <p:nvSpPr>
+          <p:cNvPr id="6" name="Title 5"/>
+          <p:cNvSpPr>
+            <a:spLocks noGrp="1"/>
+          </p:cNvSpPr>
+          <p:nvPr>
+            <p:ph type="title"/>
+          </p:nvPr>
+        </p:nvSpPr>
+        <p:spPr/>
+        <p:txBody>
+          <a:bodyPr/>
+          <a:lstStyle/>
+          <a:p>
+            <a:r>
+              <a:rPr lang="en-US" dirty="0" smtClean="0"/>
+              <a:t>LCA writings</a:t>
+            </a:r>
+            <a:endParaRPr lang="en-US" dirty="0"/>
+          </a:p>
+        </p:txBody>
+      </p:sp>
+    </p:spTree>
+    <p:extLst>
+      <p:ext uri="{BB962C8B-B14F-4D97-AF65-F5344CB8AC3E}">
+        <p14:creationId xmlns:p14="http://schemas.microsoft.com/office/powerpoint/2010/main" val="3052739354"/>
+      </p:ext>
+    </p:extLst>
+  </p:cSld>
+  <p:clrMapOvr>
+    <a:masterClrMapping/>
+  </p:clrMapOvr>
+  <p:transition>
+    <p:fade/>
+  </p:transition>
+</p:sld>
+</file>
+
+<file path=ppt/slides/slide24.xml><?xml version="1.0" encoding="utf-8"?>
+<p:sld xmlns:a="http://schemas.openxmlformats.org/drawingml/2006/main" xmlns:r="http://schemas.openxmlformats.org/officeDocument/2006/relationships" xmlns:p="http://schemas.openxmlformats.org/presentationml/2006/main">
+  <p:cSld>
+    <p:spTree>
+      <p:nvGrpSpPr>
+        <p:cNvPr id="1" name=""/>
+        <p:cNvGrpSpPr/>
+        <p:nvPr/>
+      </p:nvGrpSpPr>
+      <p:grpSpPr>
+        <a:xfrm>
+          <a:off x="0" y="0"/>
+          <a:ext cx="0" cy="0"/>
+          <a:chOff x="0" y="0"/>
+          <a:chExt cx="0" cy="0"/>
+        </a:xfrm>
+      </p:grpSpPr>
+      <p:sp>
+        <p:nvSpPr>
+          <p:cNvPr id="2" name="Content Placeholder 1"/>
+          <p:cNvSpPr>
+            <a:spLocks noGrp="1"/>
+          </p:cNvSpPr>
+          <p:nvPr>
+            <p:ph idx="1"/>
+          </p:nvPr>
+        </p:nvSpPr>
+        <p:spPr/>
+        <p:txBody>
+          <a:bodyPr/>
+          <a:lstStyle/>
+          <a:p>
             <a:pPr marL="0" indent="0">
               <a:buNone/>
             </a:pPr>
@@ -14858,7 +15042,7 @@
           <a:p>
             <a:fld id="{6C6AE60A-B69C-4790-82F7-3882EDF23186}" type="slidenum">
               <a:rPr lang="de-DE" smtClean="0"/>
-              <a:t>23</a:t>
+              <a:t>24</a:t>
             </a:fld>
             <a:endParaRPr lang="de-DE"/>
           </a:p>
@@ -14903,7 +15087,7 @@
 </p:sld>
 </file>
 
-<file path=ppt/slides/slide24.xml><?xml version="1.0" encoding="utf-8"?>
+<file path=ppt/slides/slide25.xml><?xml version="1.0" encoding="utf-8"?>
 <p:sld xmlns:a="http://schemas.openxmlformats.org/drawingml/2006/main" xmlns:r="http://schemas.openxmlformats.org/officeDocument/2006/relationships" xmlns:p="http://schemas.openxmlformats.org/presentationml/2006/main">
   <p:cSld>
     <p:spTree>
@@ -15033,7 +15217,7 @@
           <a:p>
             <a:fld id="{6C6AE60A-B69C-4790-82F7-3882EDF23186}" type="slidenum">
               <a:rPr lang="de-DE" smtClean="0"/>
-              <a:t>24</a:t>
+              <a:t>25</a:t>
             </a:fld>
             <a:endParaRPr lang="de-DE"/>
           </a:p>
@@ -15151,7 +15335,7 @@
 </p:sld>
 </file>
 
-<file path=ppt/slides/slide25.xml><?xml version="1.0" encoding="utf-8"?>
+<file path=ppt/slides/slide26.xml><?xml version="1.0" encoding="utf-8"?>
 <p:sld xmlns:a="http://schemas.openxmlformats.org/drawingml/2006/main" xmlns:r="http://schemas.openxmlformats.org/officeDocument/2006/relationships" xmlns:p="http://schemas.openxmlformats.org/presentationml/2006/main">
   <p:cSld>
     <p:spTree>
@@ -15256,7 +15440,7 @@
           <a:p>
             <a:fld id="{6C6AE60A-B69C-4790-82F7-3882EDF23186}" type="slidenum">
               <a:rPr lang="de-DE" smtClean="0"/>
-              <a:t>25</a:t>
+              <a:t>26</a:t>
             </a:fld>
             <a:endParaRPr lang="de-DE"/>
           </a:p>
@@ -15323,7 +15507,7 @@
 </p:sld>
 </file>
 
-<file path=ppt/slides/slide26.xml><?xml version="1.0" encoding="utf-8"?>
+<file path=ppt/slides/slide27.xml><?xml version="1.0" encoding="utf-8"?>
 <p:sld xmlns:a="http://schemas.openxmlformats.org/drawingml/2006/main" xmlns:r="http://schemas.openxmlformats.org/officeDocument/2006/relationships" xmlns:p="http://schemas.openxmlformats.org/presentationml/2006/main">
   <p:cSld>
     <p:spTree>
@@ -15429,7 +15613,7 @@
           <a:p>
             <a:fld id="{6C6AE60A-B69C-4790-82F7-3882EDF23186}" type="slidenum">
               <a:rPr lang="de-DE" smtClean="0"/>
-              <a:t>26</a:t>
+              <a:t>27</a:t>
             </a:fld>
             <a:endParaRPr lang="de-DE"/>
           </a:p>
@@ -15462,157 +15646,6 @@
     <p:extLst>
       <p:ext uri="{BB962C8B-B14F-4D97-AF65-F5344CB8AC3E}">
         <p14:creationId xmlns:p14="http://schemas.microsoft.com/office/powerpoint/2010/main" val="1703934676"/>
-      </p:ext>
-    </p:extLst>
-  </p:cSld>
-  <p:clrMapOvr>
-    <a:masterClrMapping/>
-  </p:clrMapOvr>
-  <p:transition>
-    <p:fade/>
-  </p:transition>
-</p:sld>
-</file>
-
-<file path=ppt/slides/slide27.xml><?xml version="1.0" encoding="utf-8"?>
-<p:sld xmlns:a="http://schemas.openxmlformats.org/drawingml/2006/main" xmlns:r="http://schemas.openxmlformats.org/officeDocument/2006/relationships" xmlns:p="http://schemas.openxmlformats.org/presentationml/2006/main">
-  <p:cSld>
-    <p:spTree>
-      <p:nvGrpSpPr>
-        <p:cNvPr id="1" name=""/>
-        <p:cNvGrpSpPr/>
-        <p:nvPr/>
-      </p:nvGrpSpPr>
-      <p:grpSpPr>
-        <a:xfrm>
-          <a:off x="0" y="0"/>
-          <a:ext cx="0" cy="0"/>
-          <a:chOff x="0" y="0"/>
-          <a:chExt cx="0" cy="0"/>
-        </a:xfrm>
-      </p:grpSpPr>
-      <p:pic>
-        <p:nvPicPr>
-          <p:cNvPr id="7" name="Content Placeholder 6"/>
-          <p:cNvPicPr>
-            <a:picLocks noGrp="1" noChangeAspect="1"/>
-          </p:cNvPicPr>
-          <p:nvPr>
-            <p:ph idx="1"/>
-          </p:nvPr>
-        </p:nvPicPr>
-        <p:blipFill>
-          <a:blip r:embed="rId2"/>
-          <a:stretch>
-            <a:fillRect/>
-          </a:stretch>
-        </p:blipFill>
-        <p:spPr>
-          <a:xfrm>
-            <a:off x="409029" y="1845695"/>
-            <a:ext cx="4832466" cy="4210050"/>
-          </a:xfrm>
-          <a:prstGeom prst="rect">
-            <a:avLst/>
-          </a:prstGeom>
-        </p:spPr>
-      </p:pic>
-      <p:sp>
-        <p:nvSpPr>
-          <p:cNvPr id="3" name="Date Placeholder 2"/>
-          <p:cNvSpPr>
-            <a:spLocks noGrp="1"/>
-          </p:cNvSpPr>
-          <p:nvPr>
-            <p:ph type="dt" sz="half" idx="10"/>
-          </p:nvPr>
-        </p:nvSpPr>
-        <p:spPr/>
-        <p:txBody>
-          <a:bodyPr/>
-          <a:lstStyle/>
-          <a:p>
-            <a:fld id="{FF15E650-2C9B-4E22-B544-79A90AB3DDC1}" type="datetime1">
-              <a:rPr lang="de-DE" smtClean="0"/>
-              <a:t>16.01.2023</a:t>
-            </a:fld>
-            <a:endParaRPr lang="de-DE"/>
-          </a:p>
-        </p:txBody>
-      </p:sp>
-      <p:sp>
-        <p:nvSpPr>
-          <p:cNvPr id="4" name="Footer Placeholder 3"/>
-          <p:cNvSpPr>
-            <a:spLocks noGrp="1"/>
-          </p:cNvSpPr>
-          <p:nvPr>
-            <p:ph type="ftr" sz="quarter" idx="11"/>
-          </p:nvPr>
-        </p:nvSpPr>
-        <p:spPr/>
-        <p:txBody>
-          <a:bodyPr/>
-          <a:lstStyle/>
-          <a:p>
-            <a:r>
-              <a:rPr lang="de-DE" smtClean="0"/>
-              <a:t>Shinde, Rhythima</a:t>
-            </a:r>
-            <a:endParaRPr lang="de-DE"/>
-          </a:p>
-        </p:txBody>
-      </p:sp>
-      <p:sp>
-        <p:nvSpPr>
-          <p:cNvPr id="5" name="Slide Number Placeholder 4"/>
-          <p:cNvSpPr>
-            <a:spLocks noGrp="1"/>
-          </p:cNvSpPr>
-          <p:nvPr>
-            <p:ph type="sldNum" sz="quarter" idx="12"/>
-          </p:nvPr>
-        </p:nvSpPr>
-        <p:spPr/>
-        <p:txBody>
-          <a:bodyPr/>
-          <a:lstStyle/>
-          <a:p>
-            <a:fld id="{6C6AE60A-B69C-4790-82F7-3882EDF23186}" type="slidenum">
-              <a:rPr lang="de-DE" smtClean="0"/>
-              <a:t>27</a:t>
-            </a:fld>
-            <a:endParaRPr lang="de-DE"/>
-          </a:p>
-        </p:txBody>
-      </p:sp>
-      <p:sp>
-        <p:nvSpPr>
-          <p:cNvPr id="6" name="Title 5"/>
-          <p:cNvSpPr>
-            <a:spLocks noGrp="1"/>
-          </p:cNvSpPr>
-          <p:nvPr>
-            <p:ph type="title"/>
-          </p:nvPr>
-        </p:nvSpPr>
-        <p:spPr/>
-        <p:txBody>
-          <a:bodyPr/>
-          <a:lstStyle/>
-          <a:p>
-            <a:r>
-              <a:rPr lang="en-US" dirty="0" smtClean="0"/>
-              <a:t>Paper – Case study (writing)</a:t>
-            </a:r>
-            <a:endParaRPr lang="en-US" dirty="0"/>
-          </a:p>
-        </p:txBody>
-      </p:sp>
-    </p:spTree>
-    <p:extLst>
-      <p:ext uri="{BB962C8B-B14F-4D97-AF65-F5344CB8AC3E}">
-        <p14:creationId xmlns:p14="http://schemas.microsoft.com/office/powerpoint/2010/main" val="3252225311"/>
       </p:ext>
     </p:extLst>
   </p:cSld>
@@ -15642,65 +15675,32 @@
           <a:chExt cx="0" cy="0"/>
         </a:xfrm>
       </p:grpSpPr>
-      <p:sp>
-        <p:nvSpPr>
-          <p:cNvPr id="2" name="Content Placeholder 1"/>
-          <p:cNvSpPr>
-            <a:spLocks noGrp="1"/>
-          </p:cNvSpPr>
+      <p:pic>
+        <p:nvPicPr>
+          <p:cNvPr id="7" name="Content Placeholder 6"/>
+          <p:cNvPicPr>
+            <a:picLocks noGrp="1" noChangeAspect="1"/>
+          </p:cNvPicPr>
           <p:nvPr>
             <p:ph idx="1"/>
           </p:nvPr>
-        </p:nvSpPr>
+        </p:nvPicPr>
+        <p:blipFill>
+          <a:blip r:embed="rId2"/>
+          <a:stretch>
+            <a:fillRect/>
+          </a:stretch>
+        </p:blipFill>
         <p:spPr>
           <a:xfrm>
-            <a:off x="323850" y="2552116"/>
-            <a:ext cx="8496300" cy="3681994"/>
+            <a:off x="409029" y="1845695"/>
+            <a:ext cx="4832466" cy="4210050"/>
           </a:xfrm>
+          <a:prstGeom prst="rect">
+            <a:avLst/>
+          </a:prstGeom>
         </p:spPr>
-        <p:txBody>
-          <a:bodyPr/>
-          <a:lstStyle/>
-          <a:p>
-            <a:pPr marL="457200" indent="-457200">
-              <a:buAutoNum type="arabicPeriod"/>
-            </a:pPr>
-            <a:r>
-              <a:rPr lang="en-US" dirty="0" smtClean="0"/>
-              <a:t>Paper </a:t>
-            </a:r>
-          </a:p>
-          <a:p>
-            <a:pPr marL="457200" indent="-457200">
-              <a:buAutoNum type="arabicPeriod"/>
-            </a:pPr>
-            <a:endParaRPr lang="en-US" dirty="0"/>
-          </a:p>
-          <a:p>
-            <a:pPr marL="457200" indent="-457200">
-              <a:buAutoNum type="arabicPeriod"/>
-            </a:pPr>
-            <a:r>
-              <a:rPr lang="en-US" dirty="0" smtClean="0"/>
-              <a:t>Model &amp; Results</a:t>
-            </a:r>
-          </a:p>
-          <a:p>
-            <a:pPr lvl="1"/>
-            <a:endParaRPr lang="en-US" dirty="0"/>
-          </a:p>
-          <a:p>
-            <a:pPr lvl="1"/>
-            <a:endParaRPr lang="en-US" dirty="0"/>
-          </a:p>
-          <a:p>
-            <a:pPr marL="0" indent="0">
-              <a:buNone/>
-            </a:pPr>
-            <a:endParaRPr lang="en-US" dirty="0"/>
-          </a:p>
-        </p:txBody>
-      </p:sp>
+      </p:pic>
       <p:sp>
         <p:nvSpPr>
           <p:cNvPr id="3" name="Date Placeholder 2"/>
@@ -15787,41 +15787,7 @@
           <a:p>
             <a:r>
               <a:rPr lang="en-US" dirty="0" smtClean="0"/>
-              <a:t>Agenda</a:t>
-            </a:r>
-            <a:endParaRPr lang="en-US" dirty="0"/>
-          </a:p>
-        </p:txBody>
-      </p:sp>
-      <p:sp>
-        <p:nvSpPr>
-          <p:cNvPr id="7" name="TextBox 6">
-            <a:hlinkClick r:id="rId2"/>
-          </p:cNvPr>
-          <p:cNvSpPr txBox="1"/>
-          <p:nvPr/>
-        </p:nvSpPr>
-        <p:spPr>
-          <a:xfrm>
-            <a:off x="323850" y="1887749"/>
-            <a:ext cx="2121093" cy="369332"/>
-          </a:xfrm>
-          <a:prstGeom prst="rect">
-            <a:avLst/>
-          </a:prstGeom>
-          <a:noFill/>
-        </p:spPr>
-        <p:txBody>
-          <a:bodyPr wrap="none" rtlCol="0">
-            <a:spAutoFit/>
-          </a:bodyPr>
-          <a:lstStyle/>
-          <a:p>
-            <a:r>
-              <a:rPr lang="en-US" dirty="0" smtClean="0">
-                <a:hlinkClick r:id="rId2"/>
-              </a:rPr>
-              <a:t>Old plan till 24 Nov</a:t>
+              <a:t>Paper – Case study (writing)</a:t>
             </a:r>
             <a:endParaRPr lang="en-US" dirty="0"/>
           </a:p>
@@ -15830,7 +15796,7 @@
     </p:spTree>
     <p:extLst>
       <p:ext uri="{BB962C8B-B14F-4D97-AF65-F5344CB8AC3E}">
-        <p14:creationId xmlns:p14="http://schemas.microsoft.com/office/powerpoint/2010/main" val="2461387543"/>
+        <p14:creationId xmlns:p14="http://schemas.microsoft.com/office/powerpoint/2010/main" val="3252225311"/>
       </p:ext>
     </p:extLst>
   </p:cSld>
@@ -15840,13 +15806,6 @@
   <p:transition>
     <p:fade/>
   </p:transition>
-  <p:timing>
-    <p:tnLst>
-      <p:par>
-        <p:cTn id="1" dur="indefinite" restart="never" nodeType="tmRoot"/>
-      </p:par>
-    </p:tnLst>
-  </p:timing>
 </p:sld>
 </file>
 
@@ -15877,12 +15836,52 @@
             <p:ph idx="1"/>
           </p:nvPr>
         </p:nvSpPr>
-        <p:spPr/>
+        <p:spPr>
+          <a:xfrm>
+            <a:off x="323850" y="2552116"/>
+            <a:ext cx="8496300" cy="3681994"/>
+          </a:xfrm>
+        </p:spPr>
         <p:txBody>
           <a:bodyPr/>
           <a:lstStyle/>
           <a:p>
-            <a:endParaRPr lang="en-US"/>
+            <a:pPr marL="457200" indent="-457200">
+              <a:buAutoNum type="arabicPeriod"/>
+            </a:pPr>
+            <a:r>
+              <a:rPr lang="en-US" dirty="0" smtClean="0"/>
+              <a:t>Paper </a:t>
+            </a:r>
+          </a:p>
+          <a:p>
+            <a:pPr marL="457200" indent="-457200">
+              <a:buAutoNum type="arabicPeriod"/>
+            </a:pPr>
+            <a:endParaRPr lang="en-US" dirty="0"/>
+          </a:p>
+          <a:p>
+            <a:pPr marL="457200" indent="-457200">
+              <a:buAutoNum type="arabicPeriod"/>
+            </a:pPr>
+            <a:r>
+              <a:rPr lang="en-US" dirty="0" smtClean="0"/>
+              <a:t>Model &amp; Results</a:t>
+            </a:r>
+          </a:p>
+          <a:p>
+            <a:pPr lvl="1"/>
+            <a:endParaRPr lang="en-US" dirty="0"/>
+          </a:p>
+          <a:p>
+            <a:pPr lvl="1"/>
+            <a:endParaRPr lang="en-US" dirty="0"/>
+          </a:p>
+          <a:p>
+            <a:pPr marL="0" indent="0">
+              <a:buNone/>
+            </a:pPr>
+            <a:endParaRPr lang="en-US" dirty="0"/>
           </a:p>
         </p:txBody>
       </p:sp>
@@ -15972,212 +15971,50 @@
           <a:p>
             <a:r>
               <a:rPr lang="en-US" dirty="0" smtClean="0"/>
-              <a:t>Paper – Data description (table)</a:t>
+              <a:t>Agenda</a:t>
             </a:r>
             <a:endParaRPr lang="en-US" dirty="0"/>
           </a:p>
         </p:txBody>
       </p:sp>
-      <p:pic>
-        <p:nvPicPr>
-          <p:cNvPr id="7" name="Picture 6"/>
-          <p:cNvPicPr>
-            <a:picLocks noChangeAspect="1"/>
-          </p:cNvPicPr>
+      <p:sp>
+        <p:nvSpPr>
+          <p:cNvPr id="7" name="TextBox 6">
+            <a:hlinkClick r:id="rId2"/>
+          </p:cNvPr>
+          <p:cNvSpPr txBox="1"/>
           <p:nvPr/>
-        </p:nvPicPr>
-        <p:blipFill>
-          <a:blip r:embed="rId2"/>
-          <a:stretch>
-            <a:fillRect/>
-          </a:stretch>
-        </p:blipFill>
+        </p:nvSpPr>
         <p:spPr>
           <a:xfrm>
-            <a:off x="4286445" y="1701538"/>
-            <a:ext cx="4473256" cy="5156462"/>
+            <a:off x="323850" y="1887749"/>
+            <a:ext cx="2121093" cy="369332"/>
           </a:xfrm>
           <a:prstGeom prst="rect">
             <a:avLst/>
           </a:prstGeom>
+          <a:noFill/>
         </p:spPr>
-      </p:pic>
-      <p:pic>
-        <p:nvPicPr>
-          <p:cNvPr id="8" name="Picture 7"/>
-          <p:cNvPicPr>
-            <a:picLocks noChangeAspect="1"/>
-          </p:cNvPicPr>
-          <p:nvPr/>
-        </p:nvPicPr>
-        <p:blipFill>
-          <a:blip r:embed="rId3"/>
-          <a:stretch>
-            <a:fillRect/>
-          </a:stretch>
-        </p:blipFill>
-        <p:spPr>
-          <a:xfrm>
-            <a:off x="209609" y="1915240"/>
-            <a:ext cx="3943486" cy="3987609"/>
-          </a:xfrm>
-          <a:prstGeom prst="rect">
-            <a:avLst/>
-          </a:prstGeom>
-        </p:spPr>
-      </p:pic>
-      <p:cxnSp>
-        <p:nvCxnSpPr>
-          <p:cNvPr id="10" name="Straight Arrow Connector 9"/>
-          <p:cNvCxnSpPr/>
-          <p:nvPr/>
-        </p:nvCxnSpPr>
-        <p:spPr>
-          <a:xfrm flipV="1">
-            <a:off x="1326911" y="2743200"/>
-            <a:ext cx="2959534" cy="144379"/>
-          </a:xfrm>
-          <a:prstGeom prst="straightConnector1">
-            <a:avLst/>
-          </a:prstGeom>
-          <a:ln w="19050">
-            <a:solidFill>
-              <a:srgbClr val="FF0000"/>
-            </a:solidFill>
-            <a:headEnd type="none" w="med" len="med"/>
-            <a:tailEnd type="triangle"/>
-          </a:ln>
-        </p:spPr>
-        <p:style>
-          <a:lnRef idx="1">
-            <a:schemeClr val="accent1"/>
-          </a:lnRef>
-          <a:fillRef idx="0">
-            <a:schemeClr val="accent1"/>
-          </a:fillRef>
-          <a:effectRef idx="0">
-            <a:schemeClr val="accent1"/>
-          </a:effectRef>
-          <a:fontRef idx="minor">
-            <a:schemeClr val="tx1"/>
-          </a:fontRef>
-        </p:style>
-      </p:cxnSp>
-      <p:cxnSp>
-        <p:nvCxnSpPr>
-          <p:cNvPr id="11" name="Straight Arrow Connector 10"/>
-          <p:cNvCxnSpPr/>
-          <p:nvPr/>
-        </p:nvCxnSpPr>
-        <p:spPr>
-          <a:xfrm>
-            <a:off x="1193561" y="4053424"/>
-            <a:ext cx="3144683" cy="435231"/>
-          </a:xfrm>
-          <a:prstGeom prst="straightConnector1">
-            <a:avLst/>
-          </a:prstGeom>
-          <a:ln w="19050">
-            <a:solidFill>
-              <a:srgbClr val="FF0000"/>
-            </a:solidFill>
-            <a:headEnd type="none" w="med" len="med"/>
-            <a:tailEnd type="triangle"/>
-          </a:ln>
-        </p:spPr>
-        <p:style>
-          <a:lnRef idx="1">
-            <a:schemeClr val="accent1"/>
-          </a:lnRef>
-          <a:fillRef idx="0">
-            <a:schemeClr val="accent1"/>
-          </a:fillRef>
-          <a:effectRef idx="0">
-            <a:schemeClr val="accent1"/>
-          </a:effectRef>
-          <a:fontRef idx="minor">
-            <a:schemeClr val="tx1"/>
-          </a:fontRef>
-        </p:style>
-      </p:cxnSp>
-      <p:cxnSp>
-        <p:nvCxnSpPr>
-          <p:cNvPr id="13" name="Straight Arrow Connector 12"/>
-          <p:cNvCxnSpPr/>
-          <p:nvPr/>
-        </p:nvCxnSpPr>
-        <p:spPr>
-          <a:xfrm>
-            <a:off x="1234336" y="5133419"/>
-            <a:ext cx="3144683" cy="435231"/>
-          </a:xfrm>
-          <a:prstGeom prst="straightConnector1">
-            <a:avLst/>
-          </a:prstGeom>
-          <a:ln w="19050">
-            <a:solidFill>
-              <a:srgbClr val="FF0000"/>
-            </a:solidFill>
-            <a:headEnd type="none" w="med" len="med"/>
-            <a:tailEnd type="triangle"/>
-          </a:ln>
-        </p:spPr>
-        <p:style>
-          <a:lnRef idx="1">
-            <a:schemeClr val="accent1"/>
-          </a:lnRef>
-          <a:fillRef idx="0">
-            <a:schemeClr val="accent1"/>
-          </a:fillRef>
-          <a:effectRef idx="0">
-            <a:schemeClr val="accent1"/>
-          </a:effectRef>
-          <a:fontRef idx="minor">
-            <a:schemeClr val="tx1"/>
-          </a:fontRef>
-        </p:style>
-      </p:cxnSp>
-      <p:cxnSp>
-        <p:nvCxnSpPr>
-          <p:cNvPr id="14" name="Straight Arrow Connector 13"/>
-          <p:cNvCxnSpPr/>
-          <p:nvPr/>
-        </p:nvCxnSpPr>
-        <p:spPr>
-          <a:xfrm>
-            <a:off x="1326911" y="5467618"/>
-            <a:ext cx="2959534" cy="841108"/>
-          </a:xfrm>
-          <a:prstGeom prst="straightConnector1">
-            <a:avLst/>
-          </a:prstGeom>
-          <a:ln w="19050">
-            <a:solidFill>
-              <a:srgbClr val="FF0000"/>
-            </a:solidFill>
-            <a:headEnd type="none" w="med" len="med"/>
-            <a:tailEnd type="triangle"/>
-          </a:ln>
-        </p:spPr>
-        <p:style>
-          <a:lnRef idx="1">
-            <a:schemeClr val="accent1"/>
-          </a:lnRef>
-          <a:fillRef idx="0">
-            <a:schemeClr val="accent1"/>
-          </a:fillRef>
-          <a:effectRef idx="0">
-            <a:schemeClr val="accent1"/>
-          </a:effectRef>
-          <a:fontRef idx="minor">
-            <a:schemeClr val="tx1"/>
-          </a:fontRef>
-        </p:style>
-      </p:cxnSp>
+        <p:txBody>
+          <a:bodyPr wrap="none" rtlCol="0">
+            <a:spAutoFit/>
+          </a:bodyPr>
+          <a:lstStyle/>
+          <a:p>
+            <a:r>
+              <a:rPr lang="en-US" dirty="0" smtClean="0">
+                <a:hlinkClick r:id="rId2"/>
+              </a:rPr>
+              <a:t>Old plan till 24 Nov</a:t>
+            </a:r>
+            <a:endParaRPr lang="en-US" dirty="0"/>
+          </a:p>
+        </p:txBody>
+      </p:sp>
     </p:spTree>
     <p:extLst>
       <p:ext uri="{BB962C8B-B14F-4D97-AF65-F5344CB8AC3E}">
-        <p14:creationId xmlns:p14="http://schemas.microsoft.com/office/powerpoint/2010/main" val="3615969753"/>
+        <p14:creationId xmlns:p14="http://schemas.microsoft.com/office/powerpoint/2010/main" val="2461387543"/>
       </p:ext>
     </p:extLst>
   </p:cSld>
@@ -16187,6 +16024,13 @@
   <p:transition>
     <p:fade/>
   </p:transition>
+  <p:timing>
+    <p:tnLst>
+      <p:par>
+        <p:cTn id="1" dur="indefinite" restart="never" nodeType="tmRoot"/>
+      </p:par>
+    </p:tnLst>
+  </p:timing>
 </p:sld>
 </file>
 
@@ -17648,6 +17492,25 @@
       </p:grpSpPr>
       <p:sp>
         <p:nvSpPr>
+          <p:cNvPr id="2" name="Content Placeholder 1"/>
+          <p:cNvSpPr>
+            <a:spLocks noGrp="1"/>
+          </p:cNvSpPr>
+          <p:nvPr>
+            <p:ph idx="1"/>
+          </p:nvPr>
+        </p:nvSpPr>
+        <p:spPr/>
+        <p:txBody>
+          <a:bodyPr/>
+          <a:lstStyle/>
+          <a:p>
+            <a:endParaRPr lang="en-US"/>
+          </a:p>
+        </p:txBody>
+      </p:sp>
+      <p:sp>
+        <p:nvSpPr>
           <p:cNvPr id="3" name="Date Placeholder 2"/>
           <p:cNvSpPr>
             <a:spLocks noGrp="1"/>
@@ -17710,6 +17573,327 @@
             <a:fld id="{6C6AE60A-B69C-4790-82F7-3882EDF23186}" type="slidenum">
               <a:rPr lang="de-DE" smtClean="0"/>
               <a:t>30</a:t>
+            </a:fld>
+            <a:endParaRPr lang="de-DE"/>
+          </a:p>
+        </p:txBody>
+      </p:sp>
+      <p:sp>
+        <p:nvSpPr>
+          <p:cNvPr id="6" name="Title 5"/>
+          <p:cNvSpPr>
+            <a:spLocks noGrp="1"/>
+          </p:cNvSpPr>
+          <p:nvPr>
+            <p:ph type="title"/>
+          </p:nvPr>
+        </p:nvSpPr>
+        <p:spPr/>
+        <p:txBody>
+          <a:bodyPr/>
+          <a:lstStyle/>
+          <a:p>
+            <a:r>
+              <a:rPr lang="en-US" dirty="0" smtClean="0"/>
+              <a:t>Paper – Data description (table)</a:t>
+            </a:r>
+            <a:endParaRPr lang="en-US" dirty="0"/>
+          </a:p>
+        </p:txBody>
+      </p:sp>
+      <p:pic>
+        <p:nvPicPr>
+          <p:cNvPr id="7" name="Picture 6"/>
+          <p:cNvPicPr>
+            <a:picLocks noChangeAspect="1"/>
+          </p:cNvPicPr>
+          <p:nvPr/>
+        </p:nvPicPr>
+        <p:blipFill>
+          <a:blip r:embed="rId2"/>
+          <a:stretch>
+            <a:fillRect/>
+          </a:stretch>
+        </p:blipFill>
+        <p:spPr>
+          <a:xfrm>
+            <a:off x="4286445" y="1701538"/>
+            <a:ext cx="4473256" cy="5156462"/>
+          </a:xfrm>
+          <a:prstGeom prst="rect">
+            <a:avLst/>
+          </a:prstGeom>
+        </p:spPr>
+      </p:pic>
+      <p:pic>
+        <p:nvPicPr>
+          <p:cNvPr id="8" name="Picture 7"/>
+          <p:cNvPicPr>
+            <a:picLocks noChangeAspect="1"/>
+          </p:cNvPicPr>
+          <p:nvPr/>
+        </p:nvPicPr>
+        <p:blipFill>
+          <a:blip r:embed="rId3"/>
+          <a:stretch>
+            <a:fillRect/>
+          </a:stretch>
+        </p:blipFill>
+        <p:spPr>
+          <a:xfrm>
+            <a:off x="209609" y="1915240"/>
+            <a:ext cx="3943486" cy="3987609"/>
+          </a:xfrm>
+          <a:prstGeom prst="rect">
+            <a:avLst/>
+          </a:prstGeom>
+        </p:spPr>
+      </p:pic>
+      <p:cxnSp>
+        <p:nvCxnSpPr>
+          <p:cNvPr id="10" name="Straight Arrow Connector 9"/>
+          <p:cNvCxnSpPr/>
+          <p:nvPr/>
+        </p:nvCxnSpPr>
+        <p:spPr>
+          <a:xfrm flipV="1">
+            <a:off x="1326911" y="2743200"/>
+            <a:ext cx="2959534" cy="144379"/>
+          </a:xfrm>
+          <a:prstGeom prst="straightConnector1">
+            <a:avLst/>
+          </a:prstGeom>
+          <a:ln w="19050">
+            <a:solidFill>
+              <a:srgbClr val="FF0000"/>
+            </a:solidFill>
+            <a:headEnd type="none" w="med" len="med"/>
+            <a:tailEnd type="triangle"/>
+          </a:ln>
+        </p:spPr>
+        <p:style>
+          <a:lnRef idx="1">
+            <a:schemeClr val="accent1"/>
+          </a:lnRef>
+          <a:fillRef idx="0">
+            <a:schemeClr val="accent1"/>
+          </a:fillRef>
+          <a:effectRef idx="0">
+            <a:schemeClr val="accent1"/>
+          </a:effectRef>
+          <a:fontRef idx="minor">
+            <a:schemeClr val="tx1"/>
+          </a:fontRef>
+        </p:style>
+      </p:cxnSp>
+      <p:cxnSp>
+        <p:nvCxnSpPr>
+          <p:cNvPr id="11" name="Straight Arrow Connector 10"/>
+          <p:cNvCxnSpPr/>
+          <p:nvPr/>
+        </p:nvCxnSpPr>
+        <p:spPr>
+          <a:xfrm>
+            <a:off x="1193561" y="4053424"/>
+            <a:ext cx="3144683" cy="435231"/>
+          </a:xfrm>
+          <a:prstGeom prst="straightConnector1">
+            <a:avLst/>
+          </a:prstGeom>
+          <a:ln w="19050">
+            <a:solidFill>
+              <a:srgbClr val="FF0000"/>
+            </a:solidFill>
+            <a:headEnd type="none" w="med" len="med"/>
+            <a:tailEnd type="triangle"/>
+          </a:ln>
+        </p:spPr>
+        <p:style>
+          <a:lnRef idx="1">
+            <a:schemeClr val="accent1"/>
+          </a:lnRef>
+          <a:fillRef idx="0">
+            <a:schemeClr val="accent1"/>
+          </a:fillRef>
+          <a:effectRef idx="0">
+            <a:schemeClr val="accent1"/>
+          </a:effectRef>
+          <a:fontRef idx="minor">
+            <a:schemeClr val="tx1"/>
+          </a:fontRef>
+        </p:style>
+      </p:cxnSp>
+      <p:cxnSp>
+        <p:nvCxnSpPr>
+          <p:cNvPr id="13" name="Straight Arrow Connector 12"/>
+          <p:cNvCxnSpPr/>
+          <p:nvPr/>
+        </p:nvCxnSpPr>
+        <p:spPr>
+          <a:xfrm>
+            <a:off x="1234336" y="5133419"/>
+            <a:ext cx="3144683" cy="435231"/>
+          </a:xfrm>
+          <a:prstGeom prst="straightConnector1">
+            <a:avLst/>
+          </a:prstGeom>
+          <a:ln w="19050">
+            <a:solidFill>
+              <a:srgbClr val="FF0000"/>
+            </a:solidFill>
+            <a:headEnd type="none" w="med" len="med"/>
+            <a:tailEnd type="triangle"/>
+          </a:ln>
+        </p:spPr>
+        <p:style>
+          <a:lnRef idx="1">
+            <a:schemeClr val="accent1"/>
+          </a:lnRef>
+          <a:fillRef idx="0">
+            <a:schemeClr val="accent1"/>
+          </a:fillRef>
+          <a:effectRef idx="0">
+            <a:schemeClr val="accent1"/>
+          </a:effectRef>
+          <a:fontRef idx="minor">
+            <a:schemeClr val="tx1"/>
+          </a:fontRef>
+        </p:style>
+      </p:cxnSp>
+      <p:cxnSp>
+        <p:nvCxnSpPr>
+          <p:cNvPr id="14" name="Straight Arrow Connector 13"/>
+          <p:cNvCxnSpPr/>
+          <p:nvPr/>
+        </p:nvCxnSpPr>
+        <p:spPr>
+          <a:xfrm>
+            <a:off x="1326911" y="5467618"/>
+            <a:ext cx="2959534" cy="841108"/>
+          </a:xfrm>
+          <a:prstGeom prst="straightConnector1">
+            <a:avLst/>
+          </a:prstGeom>
+          <a:ln w="19050">
+            <a:solidFill>
+              <a:srgbClr val="FF0000"/>
+            </a:solidFill>
+            <a:headEnd type="none" w="med" len="med"/>
+            <a:tailEnd type="triangle"/>
+          </a:ln>
+        </p:spPr>
+        <p:style>
+          <a:lnRef idx="1">
+            <a:schemeClr val="accent1"/>
+          </a:lnRef>
+          <a:fillRef idx="0">
+            <a:schemeClr val="accent1"/>
+          </a:fillRef>
+          <a:effectRef idx="0">
+            <a:schemeClr val="accent1"/>
+          </a:effectRef>
+          <a:fontRef idx="minor">
+            <a:schemeClr val="tx1"/>
+          </a:fontRef>
+        </p:style>
+      </p:cxnSp>
+    </p:spTree>
+    <p:extLst>
+      <p:ext uri="{BB962C8B-B14F-4D97-AF65-F5344CB8AC3E}">
+        <p14:creationId xmlns:p14="http://schemas.microsoft.com/office/powerpoint/2010/main" val="3615969753"/>
+      </p:ext>
+    </p:extLst>
+  </p:cSld>
+  <p:clrMapOvr>
+    <a:masterClrMapping/>
+  </p:clrMapOvr>
+  <p:transition>
+    <p:fade/>
+  </p:transition>
+</p:sld>
+</file>
+
+<file path=ppt/slides/slide31.xml><?xml version="1.0" encoding="utf-8"?>
+<p:sld xmlns:a="http://schemas.openxmlformats.org/drawingml/2006/main" xmlns:r="http://schemas.openxmlformats.org/officeDocument/2006/relationships" xmlns:p="http://schemas.openxmlformats.org/presentationml/2006/main">
+  <p:cSld>
+    <p:spTree>
+      <p:nvGrpSpPr>
+        <p:cNvPr id="1" name=""/>
+        <p:cNvGrpSpPr/>
+        <p:nvPr/>
+      </p:nvGrpSpPr>
+      <p:grpSpPr>
+        <a:xfrm>
+          <a:off x="0" y="0"/>
+          <a:ext cx="0" cy="0"/>
+          <a:chOff x="0" y="0"/>
+          <a:chExt cx="0" cy="0"/>
+        </a:xfrm>
+      </p:grpSpPr>
+      <p:sp>
+        <p:nvSpPr>
+          <p:cNvPr id="3" name="Date Placeholder 2"/>
+          <p:cNvSpPr>
+            <a:spLocks noGrp="1"/>
+          </p:cNvSpPr>
+          <p:nvPr>
+            <p:ph type="dt" sz="half" idx="10"/>
+          </p:nvPr>
+        </p:nvSpPr>
+        <p:spPr/>
+        <p:txBody>
+          <a:bodyPr/>
+          <a:lstStyle/>
+          <a:p>
+            <a:fld id="{FF15E650-2C9B-4E22-B544-79A90AB3DDC1}" type="datetime1">
+              <a:rPr lang="de-DE" smtClean="0"/>
+              <a:t>16.01.2023</a:t>
+            </a:fld>
+            <a:endParaRPr lang="de-DE"/>
+          </a:p>
+        </p:txBody>
+      </p:sp>
+      <p:sp>
+        <p:nvSpPr>
+          <p:cNvPr id="4" name="Footer Placeholder 3"/>
+          <p:cNvSpPr>
+            <a:spLocks noGrp="1"/>
+          </p:cNvSpPr>
+          <p:nvPr>
+            <p:ph type="ftr" sz="quarter" idx="11"/>
+          </p:nvPr>
+        </p:nvSpPr>
+        <p:spPr/>
+        <p:txBody>
+          <a:bodyPr/>
+          <a:lstStyle/>
+          <a:p>
+            <a:r>
+              <a:rPr lang="de-DE" smtClean="0"/>
+              <a:t>Shinde, Rhythima</a:t>
+            </a:r>
+            <a:endParaRPr lang="de-DE"/>
+          </a:p>
+        </p:txBody>
+      </p:sp>
+      <p:sp>
+        <p:nvSpPr>
+          <p:cNvPr id="5" name="Slide Number Placeholder 4"/>
+          <p:cNvSpPr>
+            <a:spLocks noGrp="1"/>
+          </p:cNvSpPr>
+          <p:nvPr>
+            <p:ph type="sldNum" sz="quarter" idx="12"/>
+          </p:nvPr>
+        </p:nvSpPr>
+        <p:spPr/>
+        <p:txBody>
+          <a:bodyPr/>
+          <a:lstStyle/>
+          <a:p>
+            <a:fld id="{6C6AE60A-B69C-4790-82F7-3882EDF23186}" type="slidenum">
+              <a:rPr lang="de-DE" smtClean="0"/>
+              <a:t>31</a:t>
             </a:fld>
             <a:endParaRPr lang="de-DE"/>
           </a:p>
@@ -17839,7 +18023,7 @@
 </p:sld>
 </file>
 
-<file path=ppt/slides/slide31.xml><?xml version="1.0" encoding="utf-8"?>
+<file path=ppt/slides/slide32.xml><?xml version="1.0" encoding="utf-8"?>
 <p:sld xmlns:a="http://schemas.openxmlformats.org/drawingml/2006/main" xmlns:r="http://schemas.openxmlformats.org/officeDocument/2006/relationships" xmlns:p="http://schemas.openxmlformats.org/presentationml/2006/main">
   <p:cSld>
     <p:spTree>
@@ -17944,7 +18128,7 @@
           <a:p>
             <a:fld id="{6C6AE60A-B69C-4790-82F7-3882EDF23186}" type="slidenum">
               <a:rPr lang="de-DE" smtClean="0"/>
-              <a:t>31</a:t>
+              <a:t>32</a:t>
             </a:fld>
             <a:endParaRPr lang="de-DE"/>
           </a:p>
@@ -18012,7 +18196,7 @@
 </p:sld>
 </file>
 
-<file path=ppt/slides/slide32.xml><?xml version="1.0" encoding="utf-8"?>
+<file path=ppt/slides/slide33.xml><?xml version="1.0" encoding="utf-8"?>
 <p:sld xmlns:a="http://schemas.openxmlformats.org/drawingml/2006/main" xmlns:r="http://schemas.openxmlformats.org/officeDocument/2006/relationships" xmlns:p="http://schemas.openxmlformats.org/presentationml/2006/main">
   <p:cSld>
     <p:spTree>
@@ -18121,7 +18305,7 @@
           <a:p>
             <a:fld id="{6C6AE60A-B69C-4790-82F7-3882EDF23186}" type="slidenum">
               <a:rPr lang="de-DE" smtClean="0"/>
-              <a:t>32</a:t>
+              <a:t>33</a:t>
             </a:fld>
             <a:endParaRPr lang="de-DE"/>
           </a:p>
@@ -18236,7 +18420,7 @@
 </p:sld>
 </file>
 
-<file path=ppt/slides/slide33.xml><?xml version="1.0" encoding="utf-8"?>
+<file path=ppt/slides/slide34.xml><?xml version="1.0" encoding="utf-8"?>
 <p:sld xmlns:a="http://schemas.openxmlformats.org/drawingml/2006/main" xmlns:r="http://schemas.openxmlformats.org/officeDocument/2006/relationships" xmlns:p="http://schemas.openxmlformats.org/presentationml/2006/main" show="0">
   <p:cSld>
     <p:spTree>
@@ -18345,7 +18529,7 @@
           <a:p>
             <a:fld id="{6C6AE60A-B69C-4790-82F7-3882EDF23186}" type="slidenum">
               <a:rPr lang="de-DE" smtClean="0"/>
-              <a:t>33</a:t>
+              <a:t>34</a:t>
             </a:fld>
             <a:endParaRPr lang="de-DE"/>
           </a:p>
@@ -18355,136 +18539,6 @@
     <p:extLst>
       <p:ext uri="{BB962C8B-B14F-4D97-AF65-F5344CB8AC3E}">
         <p14:creationId xmlns:p14="http://schemas.microsoft.com/office/powerpoint/2010/main" val="3440191758"/>
-      </p:ext>
-    </p:extLst>
-  </p:cSld>
-  <p:clrMapOvr>
-    <a:masterClrMapping/>
-  </p:clrMapOvr>
-  <p:transition>
-    <p:fade/>
-  </p:transition>
-</p:sld>
-</file>
-
-<file path=ppt/slides/slide34.xml><?xml version="1.0" encoding="utf-8"?>
-<p:sld xmlns:a="http://schemas.openxmlformats.org/drawingml/2006/main" xmlns:r="http://schemas.openxmlformats.org/officeDocument/2006/relationships" xmlns:p="http://schemas.openxmlformats.org/presentationml/2006/main" show="0">
-  <p:cSld>
-    <p:spTree>
-      <p:nvGrpSpPr>
-        <p:cNvPr id="1" name=""/>
-        <p:cNvGrpSpPr/>
-        <p:nvPr/>
-      </p:nvGrpSpPr>
-      <p:grpSpPr>
-        <a:xfrm>
-          <a:off x="0" y="0"/>
-          <a:ext cx="0" cy="0"/>
-          <a:chOff x="0" y="0"/>
-          <a:chExt cx="0" cy="0"/>
-        </a:xfrm>
-      </p:grpSpPr>
-      <p:pic>
-        <p:nvPicPr>
-          <p:cNvPr id="7" name="Content Placeholder 6"/>
-          <p:cNvPicPr>
-            <a:picLocks noGrp="1" noChangeAspect="1"/>
-          </p:cNvPicPr>
-          <p:nvPr>
-            <p:ph idx="1"/>
-          </p:nvPr>
-        </p:nvPicPr>
-        <p:blipFill rotWithShape="1">
-          <a:blip r:embed="rId2" cstate="print">
-            <a:extLst>
-              <a:ext uri="{28A0092B-C50C-407E-A947-70E740481C1C}">
-                <a14:useLocalDpi xmlns:a14="http://schemas.microsoft.com/office/drawing/2010/main" val="0"/>
-              </a:ext>
-            </a:extLst>
-          </a:blip>
-          <a:srcRect b="62220"/>
-          <a:stretch/>
-        </p:blipFill>
-        <p:spPr>
-          <a:xfrm>
-            <a:off x="485983" y="1144038"/>
-            <a:ext cx="8309709" cy="4362988"/>
-          </a:xfrm>
-        </p:spPr>
-      </p:pic>
-      <p:sp>
-        <p:nvSpPr>
-          <p:cNvPr id="3" name="Date Placeholder 2"/>
-          <p:cNvSpPr>
-            <a:spLocks noGrp="1"/>
-          </p:cNvSpPr>
-          <p:nvPr>
-            <p:ph type="dt" sz="half" idx="10"/>
-          </p:nvPr>
-        </p:nvSpPr>
-        <p:spPr/>
-        <p:txBody>
-          <a:bodyPr/>
-          <a:lstStyle/>
-          <a:p>
-            <a:fld id="{FF15E650-2C9B-4E22-B544-79A90AB3DDC1}" type="datetime1">
-              <a:rPr lang="de-DE" smtClean="0"/>
-              <a:t>16.01.2023</a:t>
-            </a:fld>
-            <a:endParaRPr lang="de-DE"/>
-          </a:p>
-        </p:txBody>
-      </p:sp>
-      <p:sp>
-        <p:nvSpPr>
-          <p:cNvPr id="4" name="Footer Placeholder 3"/>
-          <p:cNvSpPr>
-            <a:spLocks noGrp="1"/>
-          </p:cNvSpPr>
-          <p:nvPr>
-            <p:ph type="ftr" sz="quarter" idx="11"/>
-          </p:nvPr>
-        </p:nvSpPr>
-        <p:spPr/>
-        <p:txBody>
-          <a:bodyPr/>
-          <a:lstStyle/>
-          <a:p>
-            <a:r>
-              <a:rPr lang="de-DE" smtClean="0"/>
-              <a:t>Shinde, Rhythima</a:t>
-            </a:r>
-            <a:endParaRPr lang="de-DE"/>
-          </a:p>
-        </p:txBody>
-      </p:sp>
-      <p:sp>
-        <p:nvSpPr>
-          <p:cNvPr id="5" name="Slide Number Placeholder 4"/>
-          <p:cNvSpPr>
-            <a:spLocks noGrp="1"/>
-          </p:cNvSpPr>
-          <p:nvPr>
-            <p:ph type="sldNum" sz="quarter" idx="12"/>
-          </p:nvPr>
-        </p:nvSpPr>
-        <p:spPr/>
-        <p:txBody>
-          <a:bodyPr/>
-          <a:lstStyle/>
-          <a:p>
-            <a:fld id="{6C6AE60A-B69C-4790-82F7-3882EDF23186}" type="slidenum">
-              <a:rPr lang="de-DE" smtClean="0"/>
-              <a:t>34</a:t>
-            </a:fld>
-            <a:endParaRPr lang="de-DE"/>
-          </a:p>
-        </p:txBody>
-      </p:sp>
-    </p:spTree>
-    <p:extLst>
-      <p:ext uri="{BB962C8B-B14F-4D97-AF65-F5344CB8AC3E}">
-        <p14:creationId xmlns:p14="http://schemas.microsoft.com/office/powerpoint/2010/main" val="738812974"/>
       </p:ext>
     </p:extLst>
   </p:cSld>
@@ -18514,6 +18568,34 @@
           <a:chExt cx="0" cy="0"/>
         </a:xfrm>
       </p:grpSpPr>
+      <p:pic>
+        <p:nvPicPr>
+          <p:cNvPr id="7" name="Content Placeholder 6"/>
+          <p:cNvPicPr>
+            <a:picLocks noGrp="1" noChangeAspect="1"/>
+          </p:cNvPicPr>
+          <p:nvPr>
+            <p:ph idx="1"/>
+          </p:nvPr>
+        </p:nvPicPr>
+        <p:blipFill rotWithShape="1">
+          <a:blip r:embed="rId2" cstate="print">
+            <a:extLst>
+              <a:ext uri="{28A0092B-C50C-407E-A947-70E740481C1C}">
+                <a14:useLocalDpi xmlns:a14="http://schemas.microsoft.com/office/drawing/2010/main" val="0"/>
+              </a:ext>
+            </a:extLst>
+          </a:blip>
+          <a:srcRect b="62220"/>
+          <a:stretch/>
+        </p:blipFill>
+        <p:spPr>
+          <a:xfrm>
+            <a:off x="485983" y="1144038"/>
+            <a:ext cx="8309709" cy="4362988"/>
+          </a:xfrm>
+        </p:spPr>
+      </p:pic>
       <p:sp>
         <p:nvSpPr>
           <p:cNvPr id="3" name="Date Placeholder 2"/>
@@ -18578,6 +18660,108 @@
             <a:fld id="{6C6AE60A-B69C-4790-82F7-3882EDF23186}" type="slidenum">
               <a:rPr lang="de-DE" smtClean="0"/>
               <a:t>35</a:t>
+            </a:fld>
+            <a:endParaRPr lang="de-DE"/>
+          </a:p>
+        </p:txBody>
+      </p:sp>
+    </p:spTree>
+    <p:extLst>
+      <p:ext uri="{BB962C8B-B14F-4D97-AF65-F5344CB8AC3E}">
+        <p14:creationId xmlns:p14="http://schemas.microsoft.com/office/powerpoint/2010/main" val="738812974"/>
+      </p:ext>
+    </p:extLst>
+  </p:cSld>
+  <p:clrMapOvr>
+    <a:masterClrMapping/>
+  </p:clrMapOvr>
+  <p:transition>
+    <p:fade/>
+  </p:transition>
+</p:sld>
+</file>
+
+<file path=ppt/slides/slide36.xml><?xml version="1.0" encoding="utf-8"?>
+<p:sld xmlns:a="http://schemas.openxmlformats.org/drawingml/2006/main" xmlns:r="http://schemas.openxmlformats.org/officeDocument/2006/relationships" xmlns:p="http://schemas.openxmlformats.org/presentationml/2006/main" show="0">
+  <p:cSld>
+    <p:spTree>
+      <p:nvGrpSpPr>
+        <p:cNvPr id="1" name=""/>
+        <p:cNvGrpSpPr/>
+        <p:nvPr/>
+      </p:nvGrpSpPr>
+      <p:grpSpPr>
+        <a:xfrm>
+          <a:off x="0" y="0"/>
+          <a:ext cx="0" cy="0"/>
+          <a:chOff x="0" y="0"/>
+          <a:chExt cx="0" cy="0"/>
+        </a:xfrm>
+      </p:grpSpPr>
+      <p:sp>
+        <p:nvSpPr>
+          <p:cNvPr id="3" name="Date Placeholder 2"/>
+          <p:cNvSpPr>
+            <a:spLocks noGrp="1"/>
+          </p:cNvSpPr>
+          <p:nvPr>
+            <p:ph type="dt" sz="half" idx="10"/>
+          </p:nvPr>
+        </p:nvSpPr>
+        <p:spPr/>
+        <p:txBody>
+          <a:bodyPr/>
+          <a:lstStyle/>
+          <a:p>
+            <a:fld id="{FF15E650-2C9B-4E22-B544-79A90AB3DDC1}" type="datetime1">
+              <a:rPr lang="de-DE" smtClean="0"/>
+              <a:t>16.01.2023</a:t>
+            </a:fld>
+            <a:endParaRPr lang="de-DE"/>
+          </a:p>
+        </p:txBody>
+      </p:sp>
+      <p:sp>
+        <p:nvSpPr>
+          <p:cNvPr id="4" name="Footer Placeholder 3"/>
+          <p:cNvSpPr>
+            <a:spLocks noGrp="1"/>
+          </p:cNvSpPr>
+          <p:nvPr>
+            <p:ph type="ftr" sz="quarter" idx="11"/>
+          </p:nvPr>
+        </p:nvSpPr>
+        <p:spPr/>
+        <p:txBody>
+          <a:bodyPr/>
+          <a:lstStyle/>
+          <a:p>
+            <a:r>
+              <a:rPr lang="de-DE" smtClean="0"/>
+              <a:t>Shinde, Rhythima</a:t>
+            </a:r>
+            <a:endParaRPr lang="de-DE"/>
+          </a:p>
+        </p:txBody>
+      </p:sp>
+      <p:sp>
+        <p:nvSpPr>
+          <p:cNvPr id="5" name="Slide Number Placeholder 4"/>
+          <p:cNvSpPr>
+            <a:spLocks noGrp="1"/>
+          </p:cNvSpPr>
+          <p:nvPr>
+            <p:ph type="sldNum" sz="quarter" idx="12"/>
+          </p:nvPr>
+        </p:nvSpPr>
+        <p:spPr/>
+        <p:txBody>
+          <a:bodyPr/>
+          <a:lstStyle/>
+          <a:p>
+            <a:fld id="{6C6AE60A-B69C-4790-82F7-3882EDF23186}" type="slidenum">
+              <a:rPr lang="de-DE" smtClean="0"/>
+              <a:t>36</a:t>
             </a:fld>
             <a:endParaRPr lang="de-DE"/>
           </a:p>
@@ -18628,7 +18812,7 @@
 </p:sld>
 </file>
 
-<file path=ppt/slides/slide36.xml><?xml version="1.0" encoding="utf-8"?>
+<file path=ppt/slides/slide37.xml><?xml version="1.0" encoding="utf-8"?>
 <p:sld xmlns:a="http://schemas.openxmlformats.org/drawingml/2006/main" xmlns:r="http://schemas.openxmlformats.org/officeDocument/2006/relationships" xmlns:p="http://schemas.openxmlformats.org/presentationml/2006/main">
   <p:cSld>
     <p:spTree>
@@ -18776,7 +18960,7 @@
           <a:p>
             <a:fld id="{6C6AE60A-B69C-4790-82F7-3882EDF23186}" type="slidenum">
               <a:rPr lang="de-DE" smtClean="0"/>
-              <a:t>36</a:t>
+              <a:t>37</a:t>
             </a:fld>
             <a:endParaRPr lang="de-DE"/>
           </a:p>
@@ -20492,14 +20676,14 @@
             <p:ph idx="1"/>
             <p:extLst>
               <p:ext uri="{D42A27DB-BD31-4B8C-83A1-F6EECF244321}">
-                <p14:modId xmlns:p14="http://schemas.microsoft.com/office/powerpoint/2010/main" val="1973080704"/>
+                <p14:modId xmlns:p14="http://schemas.microsoft.com/office/powerpoint/2010/main" val="3888177803"/>
               </p:ext>
             </p:extLst>
           </p:nvPr>
         </p:nvGraphicFramePr>
         <p:xfrm>
           <a:off x="323850" y="1776549"/>
-          <a:ext cx="8496300" cy="4423958"/>
+          <a:ext cx="8496300" cy="4429608"/>
         </p:xfrm>
         <a:graphic>
           <a:graphicData uri="http://schemas.openxmlformats.org/drawingml/2006/table">
@@ -20579,7 +20763,7 @@
                   </a:ext>
                 </a:extLst>
               </a:tr>
-              <a:tr h="402178">
+              <a:tr h="352806">
                 <a:tc>
                   <a:txBody>
                     <a:bodyPr/>
@@ -20618,7 +20802,6 @@
                         <a:rPr lang="en-US" sz="1200" baseline="0" dirty="0" smtClean="0"/>
                         <a:t>LCA all results </a:t>
                       </a:r>
-                      <a:endParaRPr lang="en-US" sz="1200" baseline="0" dirty="0" smtClean="0"/>
                     </a:p>
                   </a:txBody>
                   <a:tcPr>
@@ -20728,7 +20911,6 @@
                         <a:rPr lang="en-US" sz="1200" baseline="0" dirty="0" smtClean="0"/>
                         <a:t>Write Section 4.1. U Values, 4.2. Space heating</a:t>
                       </a:r>
-                      <a:endParaRPr lang="en-US" sz="1200" baseline="0" dirty="0" smtClean="0"/>
                     </a:p>
                   </a:txBody>
                   <a:tcPr>
@@ -20775,11 +20957,15 @@
                       </a:pPr>
                       <a:r>
                         <a:rPr lang="en-US" sz="1200" dirty="0" smtClean="0"/>
-                        <a:t>LCA remaining</a:t>
+                        <a:t>LCA </a:t>
+                      </a:r>
+                      <a:r>
+                        <a:rPr lang="en-US" sz="1200" dirty="0" smtClean="0"/>
+                        <a:t>reviewing </a:t>
                       </a:r>
                       <a:r>
                         <a:rPr lang="en-US" sz="1200" baseline="0" dirty="0" smtClean="0"/>
-                        <a:t> results? </a:t>
+                        <a:t>results</a:t>
                       </a:r>
                       <a:endParaRPr lang="en-US" sz="1200" dirty="0"/>
                     </a:p>
@@ -20846,7 +21032,6 @@
                         <a:rPr lang="en-US" sz="1200" baseline="0" dirty="0" smtClean="0"/>
                         <a:t>Write Section 4.3. LCA </a:t>
                       </a:r>
-                      <a:endParaRPr lang="en-US" sz="1200" baseline="0" dirty="0" smtClean="0"/>
                     </a:p>
                   </a:txBody>
                   <a:tcPr>
@@ -20959,7 +21144,6 @@
                         <a:rPr lang="en-US" sz="1200" baseline="0" dirty="0" smtClean="0"/>
                         <a:t>Scenarios results + Write Section 4.4 Scenarios</a:t>
                       </a:r>
-                      <a:endParaRPr lang="en-US" sz="1200" baseline="0" dirty="0" smtClean="0"/>
                     </a:p>
                   </a:txBody>
                   <a:tcPr>
@@ -21086,7 +21270,6 @@
                         <a:rPr lang="en-US" sz="1200" baseline="0" dirty="0" smtClean="0"/>
                         <a:t>Discussion points / writing </a:t>
                       </a:r>
-                      <a:endParaRPr lang="en-US" sz="1200" baseline="0" dirty="0" smtClean="0"/>
                     </a:p>
                   </a:txBody>
                   <a:tcPr>
@@ -21235,7 +21418,6 @@
                         <a:rPr lang="en-US" sz="1200" baseline="0" dirty="0" smtClean="0"/>
                         <a:t>Conclusion  + Abstract</a:t>
                       </a:r>
-                      <a:endParaRPr lang="en-US" sz="1200" baseline="0" dirty="0" smtClean="0"/>
                     </a:p>
                   </a:txBody>
                   <a:tcPr>
@@ -21365,6 +21547,13 @@
                       </a:r>
                       <a:endParaRPr lang="en-US" sz="1200" baseline="0" dirty="0" smtClean="0"/>
                     </a:p>
+                    <a:p>
+                      <a:r>
+                        <a:rPr lang="en-US" sz="1200" baseline="0" dirty="0" smtClean="0"/>
+                        <a:t>Paper overall read (consistency – next slide)</a:t>
+                      </a:r>
+                      <a:endParaRPr lang="en-US" sz="1200" baseline="0" dirty="0" smtClean="0"/>
+                    </a:p>
                   </a:txBody>
                   <a:tcPr>
                     <a:lnL w="12700" cmpd="sng">
@@ -21475,7 +21664,7 @@
                       </a:r>
                       <a:r>
                         <a:rPr lang="en-US" sz="1200" baseline="0" dirty="0" err="1" smtClean="0"/>
-                        <a:t>github</a:t>
+                        <a:t>Github</a:t>
                       </a:r>
                       <a:endParaRPr lang="en-US" sz="1200" baseline="0" dirty="0" smtClean="0"/>
                     </a:p>
@@ -21595,7 +21784,6 @@
                         <a:rPr lang="en-US" sz="1200" baseline="0" dirty="0" smtClean="0"/>
                         <a:t>Check the journal guidelines completely </a:t>
                       </a:r>
-                      <a:endParaRPr lang="en-US" sz="1200" baseline="0" dirty="0" smtClean="0"/>
                     </a:p>
                   </a:txBody>
                   <a:tcPr>
@@ -21716,7 +21904,6 @@
                         <a:rPr lang="en-US" sz="1200" baseline="0" dirty="0" smtClean="0"/>
                         <a:t>Submit paper </a:t>
                       </a:r>
-                      <a:endParaRPr lang="en-US" sz="1200" baseline="0" dirty="0" smtClean="0"/>
                     </a:p>
                   </a:txBody>
                   <a:tcPr>
@@ -21822,6 +22009,13 @@
   <p:transition>
     <p:fade/>
   </p:transition>
+  <p:timing>
+    <p:tnLst>
+      <p:par>
+        <p:cTn id="1" dur="indefinite" restart="never" nodeType="tmRoot"/>
+      </p:par>
+    </p:tnLst>
+  </p:timing>
 </p:sld>
 </file>
 
@@ -21844,6 +22038,37 @@
       </p:grpSpPr>
       <p:sp>
         <p:nvSpPr>
+          <p:cNvPr id="2" name="Content Placeholder 1"/>
+          <p:cNvSpPr>
+            <a:spLocks noGrp="1"/>
+          </p:cNvSpPr>
+          <p:nvPr>
+            <p:ph idx="1"/>
+          </p:nvPr>
+        </p:nvSpPr>
+        <p:spPr/>
+        <p:txBody>
+          <a:bodyPr/>
+          <a:lstStyle/>
+          <a:p>
+            <a:r>
+              <a:rPr lang="en-US" dirty="0" smtClean="0"/>
+              <a:t>12 buildings -&gt; 10 buildings </a:t>
+            </a:r>
+          </a:p>
+          <a:p>
+            <a:r>
+              <a:rPr lang="en-US" dirty="0" smtClean="0"/>
+              <a:t>Comments on the paper</a:t>
+            </a:r>
+          </a:p>
+          <a:p>
+            <a:endParaRPr lang="en-US" dirty="0"/>
+          </a:p>
+        </p:txBody>
+      </p:sp>
+      <p:sp>
+        <p:nvSpPr>
           <p:cNvPr id="3" name="Date Placeholder 2"/>
           <p:cNvSpPr>
             <a:spLocks noGrp="1"/>
@@ -21928,40 +22153,16 @@
           <a:p>
             <a:r>
               <a:rPr lang="en-US" dirty="0" smtClean="0"/>
-              <a:t>U Values</a:t>
+              <a:t>Checks for consistency of the paper</a:t>
             </a:r>
             <a:endParaRPr lang="en-US" dirty="0"/>
           </a:p>
         </p:txBody>
       </p:sp>
-      <p:graphicFrame>
-        <p:nvGraphicFramePr>
-          <p:cNvPr id="8" name="Chart 7"/>
-          <p:cNvGraphicFramePr>
-            <a:graphicFrameLocks/>
-          </p:cNvGraphicFramePr>
-          <p:nvPr>
-            <p:extLst>
-              <p:ext uri="{D42A27DB-BD31-4B8C-83A1-F6EECF244321}">
-                <p14:modId xmlns:p14="http://schemas.microsoft.com/office/powerpoint/2010/main" val="1665658394"/>
-              </p:ext>
-            </p:extLst>
-          </p:nvPr>
-        </p:nvGraphicFramePr>
-        <p:xfrm>
-          <a:off x="323850" y="1852586"/>
-          <a:ext cx="8302501" cy="4114460"/>
-        </p:xfrm>
-        <a:graphic>
-          <a:graphicData uri="http://schemas.openxmlformats.org/drawingml/2006/chart">
-            <c:chart xmlns:c="http://schemas.openxmlformats.org/drawingml/2006/chart" xmlns:r="http://schemas.openxmlformats.org/officeDocument/2006/relationships" r:id="rId2"/>
-          </a:graphicData>
-        </a:graphic>
-      </p:graphicFrame>
     </p:spTree>
     <p:extLst>
       <p:ext uri="{BB962C8B-B14F-4D97-AF65-F5344CB8AC3E}">
-        <p14:creationId xmlns:p14="http://schemas.microsoft.com/office/powerpoint/2010/main" val="990010030"/>
+        <p14:creationId xmlns:p14="http://schemas.microsoft.com/office/powerpoint/2010/main" val="32840857"/>
       </p:ext>
     </p:extLst>
   </p:cSld>
@@ -21993,106 +22194,6 @@
       </p:grpSpPr>
       <p:sp>
         <p:nvSpPr>
-          <p:cNvPr id="2" name="Content Placeholder 1"/>
-          <p:cNvSpPr>
-            <a:spLocks noGrp="1"/>
-          </p:cNvSpPr>
-          <p:nvPr>
-            <p:ph idx="1"/>
-          </p:nvPr>
-        </p:nvSpPr>
-        <p:spPr/>
-        <p:txBody>
-          <a:bodyPr/>
-          <a:lstStyle/>
-          <a:p>
-            <a:pPr marL="457200" indent="-457200">
-              <a:buAutoNum type="arabicPeriod"/>
-            </a:pPr>
-            <a:r>
-              <a:rPr lang="en-US" dirty="0" smtClean="0"/>
-              <a:t>Overall </a:t>
-            </a:r>
-            <a:r>
-              <a:rPr lang="en-US" dirty="0"/>
-              <a:t>LCA </a:t>
-            </a:r>
-          </a:p>
-          <a:p>
-            <a:pPr marL="457200" indent="-457200">
-              <a:buAutoNum type="arabicPeriod"/>
-            </a:pPr>
-            <a:r>
-              <a:rPr lang="en-US" dirty="0" smtClean="0"/>
-              <a:t>Embodied emissions</a:t>
-            </a:r>
-          </a:p>
-          <a:p>
-            <a:pPr marL="722313" lvl="1" indent="-457200">
-              <a:buFont typeface="Wingdings" pitchFamily="2" charset="2"/>
-              <a:buAutoNum type="arabicPeriod"/>
-            </a:pPr>
-            <a:r>
-              <a:rPr lang="en-US" dirty="0"/>
-              <a:t>Components of the building </a:t>
-            </a:r>
-          </a:p>
-          <a:p>
-            <a:pPr marL="457200" indent="-457200">
-              <a:buFont typeface="Wingdings" pitchFamily="2" charset="2"/>
-              <a:buAutoNum type="arabicPeriod"/>
-            </a:pPr>
-            <a:r>
-              <a:rPr lang="en-US" dirty="0" smtClean="0"/>
-              <a:t>Operational emissions</a:t>
-            </a:r>
-          </a:p>
-          <a:p>
-            <a:pPr marL="722313" lvl="1" indent="-457200">
-              <a:buFont typeface="Wingdings" pitchFamily="2" charset="2"/>
-              <a:buAutoNum type="arabicPeriod"/>
-            </a:pPr>
-            <a:r>
-              <a:rPr lang="en-US" dirty="0" smtClean="0"/>
-              <a:t>Space heating</a:t>
-            </a:r>
-          </a:p>
-          <a:p>
-            <a:pPr marL="722313" lvl="1" indent="-457200">
-              <a:buFont typeface="Wingdings" pitchFamily="2" charset="2"/>
-              <a:buAutoNum type="arabicPeriod"/>
-            </a:pPr>
-            <a:r>
-              <a:rPr lang="en-US" dirty="0" smtClean="0"/>
-              <a:t>Ventilation </a:t>
-            </a:r>
-            <a:endParaRPr lang="en-US" dirty="0"/>
-          </a:p>
-          <a:p>
-            <a:pPr lvl="1"/>
-            <a:endParaRPr lang="en-US" dirty="0"/>
-          </a:p>
-          <a:p>
-            <a:pPr marL="457200" indent="-457200">
-              <a:buAutoNum type="arabicPeriod"/>
-            </a:pPr>
-            <a:endParaRPr lang="en-US" dirty="0"/>
-          </a:p>
-          <a:p>
-            <a:pPr lvl="1"/>
-            <a:endParaRPr lang="en-US" dirty="0"/>
-          </a:p>
-          <a:p>
-            <a:pPr lvl="1"/>
-            <a:endParaRPr lang="en-US" dirty="0"/>
-          </a:p>
-          <a:p>
-            <a:endParaRPr lang="en-US" dirty="0"/>
-          </a:p>
-        </p:txBody>
-      </p:sp>
-      <p:sp>
-        <p:nvSpPr>
           <p:cNvPr id="3" name="Date Placeholder 2"/>
           <p:cNvSpPr>
             <a:spLocks noGrp="1"/>
@@ -22177,16 +22278,40 @@
           <a:p>
             <a:r>
               <a:rPr lang="en-US" dirty="0" smtClean="0"/>
-              <a:t>Results </a:t>
+              <a:t>U Values</a:t>
             </a:r>
             <a:endParaRPr lang="en-US" dirty="0"/>
           </a:p>
         </p:txBody>
       </p:sp>
+      <p:graphicFrame>
+        <p:nvGraphicFramePr>
+          <p:cNvPr id="8" name="Chart 7"/>
+          <p:cNvGraphicFramePr>
+            <a:graphicFrameLocks/>
+          </p:cNvGraphicFramePr>
+          <p:nvPr>
+            <p:extLst>
+              <p:ext uri="{D42A27DB-BD31-4B8C-83A1-F6EECF244321}">
+                <p14:modId xmlns:p14="http://schemas.microsoft.com/office/powerpoint/2010/main" val="1665658394"/>
+              </p:ext>
+            </p:extLst>
+          </p:nvPr>
+        </p:nvGraphicFramePr>
+        <p:xfrm>
+          <a:off x="323850" y="1852586"/>
+          <a:ext cx="8302501" cy="4114460"/>
+        </p:xfrm>
+        <a:graphic>
+          <a:graphicData uri="http://schemas.openxmlformats.org/drawingml/2006/chart">
+            <c:chart xmlns:c="http://schemas.openxmlformats.org/drawingml/2006/chart" xmlns:r="http://schemas.openxmlformats.org/officeDocument/2006/relationships" r:id="rId2"/>
+          </a:graphicData>
+        </a:graphic>
+      </p:graphicFrame>
     </p:spTree>
     <p:extLst>
       <p:ext uri="{BB962C8B-B14F-4D97-AF65-F5344CB8AC3E}">
-        <p14:creationId xmlns:p14="http://schemas.microsoft.com/office/powerpoint/2010/main" val="1469761683"/>
+        <p14:creationId xmlns:p14="http://schemas.microsoft.com/office/powerpoint/2010/main" val="990010030"/>
       </p:ext>
     </p:extLst>
   </p:cSld>
@@ -22238,104 +22363,88 @@
           <a:bodyPr/>
           <a:lstStyle/>
           <a:p>
-            <a:pPr marL="342900" indent="-342900">
+            <a:pPr marL="457200" indent="-457200">
               <a:buAutoNum type="arabicPeriod"/>
             </a:pPr>
             <a:r>
-              <a:rPr lang="en-US" sz="1800" dirty="0" smtClean="0"/>
-              <a:t>Overall LCA </a:t>
+              <a:rPr lang="en-US" dirty="0" smtClean="0"/>
+              <a:t>Overall </a:t>
             </a:r>
-          </a:p>
-          <a:p>
-            <a:pPr marL="342900" indent="-342900">
+            <a:r>
+              <a:rPr lang="en-US" dirty="0"/>
+              <a:t>LCA </a:t>
+            </a:r>
+          </a:p>
+          <a:p>
+            <a:pPr marL="457200" indent="-457200">
               <a:buAutoNum type="arabicPeriod"/>
             </a:pPr>
             <a:r>
-              <a:rPr lang="en-US" sz="1800" dirty="0" smtClean="0"/>
-              <a:t>Embodied </a:t>
+              <a:rPr lang="en-US" dirty="0" smtClean="0"/>
+              <a:t>Embodied emissions</a:t>
             </a:r>
-            <a:r>
-              <a:rPr lang="en-US" sz="1800" dirty="0"/>
-              <a:t>emissions</a:t>
-            </a:r>
-          </a:p>
-          <a:p>
-            <a:pPr lvl="1"/>
-            <a:r>
-              <a:rPr lang="en-US" sz="1800" dirty="0"/>
-              <a:t>Components of the building </a:t>
-            </a:r>
-          </a:p>
-          <a:p>
-            <a:pPr lvl="1"/>
-            <a:r>
-              <a:rPr lang="en-US" sz="1800" dirty="0"/>
-              <a:t>+ Transportation</a:t>
-            </a:r>
-          </a:p>
-          <a:p>
-            <a:pPr lvl="2"/>
-            <a:r>
-              <a:rPr lang="en-US" sz="1600" dirty="0"/>
-              <a:t>as assumed by Viola - lorry transportation of local and not local material till the building site)</a:t>
-            </a:r>
-            <a:endParaRPr lang="en-US" sz="1800" dirty="0" smtClean="0"/>
-          </a:p>
-          <a:p>
-            <a:pPr marL="342900" indent="-342900">
+          </a:p>
+          <a:p>
+            <a:pPr marL="722313" lvl="1" indent="-457200">
+              <a:buFont typeface="Wingdings" pitchFamily="2" charset="2"/>
               <a:buAutoNum type="arabicPeriod"/>
             </a:pPr>
             <a:r>
-              <a:rPr lang="en-US" sz="1800" dirty="0" smtClean="0"/>
+              <a:rPr lang="en-US" dirty="0"/>
+              <a:t>Components of the building </a:t>
+            </a:r>
+          </a:p>
+          <a:p>
+            <a:pPr marL="457200" indent="-457200">
+              <a:buFont typeface="Wingdings" pitchFamily="2" charset="2"/>
+              <a:buAutoNum type="arabicPeriod"/>
+            </a:pPr>
+            <a:r>
+              <a:rPr lang="en-US" dirty="0" smtClean="0"/>
               <a:t>Operational emissions</a:t>
             </a:r>
           </a:p>
           <a:p>
-            <a:pPr lvl="1"/>
+            <a:pPr marL="722313" lvl="1" indent="-457200">
+              <a:buFont typeface="Wingdings" pitchFamily="2" charset="2"/>
+              <a:buAutoNum type="arabicPeriod"/>
+            </a:pPr>
             <a:r>
-              <a:rPr lang="en-US" sz="1800" dirty="0"/>
+              <a:rPr lang="en-US" dirty="0" smtClean="0"/>
               <a:t>Space heating</a:t>
             </a:r>
           </a:p>
           <a:p>
-            <a:pPr lvl="1"/>
+            <a:pPr marL="722313" lvl="1" indent="-457200">
+              <a:buFont typeface="Wingdings" pitchFamily="2" charset="2"/>
+              <a:buAutoNum type="arabicPeriod"/>
+            </a:pPr>
             <a:r>
-              <a:rPr lang="en-US" sz="1800" dirty="0"/>
+              <a:rPr lang="en-US" dirty="0" smtClean="0"/>
               <a:t>Ventilation </a:t>
             </a:r>
+            <a:endParaRPr lang="en-US" dirty="0"/>
           </a:p>
           <a:p>
             <a:pPr lvl="1"/>
-            <a:r>
-              <a:rPr lang="en-US" sz="1800" dirty="0" smtClean="0"/>
-              <a:t>+ Hot water</a:t>
-            </a:r>
-          </a:p>
-          <a:p>
-            <a:pPr lvl="2"/>
-            <a:r>
-              <a:rPr lang="en-US" sz="1600" dirty="0" smtClean="0"/>
-              <a:t>directly associated to the reported values of hot water usage)</a:t>
-            </a:r>
+            <a:endParaRPr lang="en-US" dirty="0"/>
+          </a:p>
+          <a:p>
+            <a:pPr marL="457200" indent="-457200">
+              <a:buAutoNum type="arabicPeriod"/>
+            </a:pPr>
+            <a:endParaRPr lang="en-US" dirty="0"/>
           </a:p>
           <a:p>
             <a:pPr lvl="1"/>
-            <a:r>
-              <a:rPr lang="en-US" sz="1800" dirty="0" smtClean="0"/>
-              <a:t>+ Electricity </a:t>
-            </a:r>
-          </a:p>
-          <a:p>
-            <a:pPr lvl="2"/>
-            <a:r>
-              <a:rPr lang="en-US" sz="1600" dirty="0" smtClean="0"/>
-              <a:t>as assumed by viola based on occupancy)</a:t>
-            </a:r>
-            <a:endParaRPr lang="en-US" sz="1800" dirty="0" smtClean="0"/>
+            <a:endParaRPr lang="en-US" dirty="0"/>
           </a:p>
           <a:p>
             <a:pPr lvl="1"/>
-            <a:endParaRPr lang="en-US" sz="1800" dirty="0"/>
+            <a:endParaRPr lang="en-US" dirty="0"/>
+          </a:p>
+          <a:p>
+            <a:endParaRPr lang="en-US" dirty="0"/>
           </a:p>
         </p:txBody>
       </p:sp>
@@ -22425,7 +22534,7 @@
           <a:p>
             <a:r>
               <a:rPr lang="en-US" dirty="0" smtClean="0"/>
-              <a:t>LCA extensions</a:t>
+              <a:t>Results </a:t>
             </a:r>
             <a:endParaRPr lang="en-US" dirty="0"/>
           </a:p>
@@ -22434,7 +22543,7 @@
     </p:spTree>
     <p:extLst>
       <p:ext uri="{BB962C8B-B14F-4D97-AF65-F5344CB8AC3E}">
-        <p14:creationId xmlns:p14="http://schemas.microsoft.com/office/powerpoint/2010/main" val="2135928578"/>
+        <p14:creationId xmlns:p14="http://schemas.microsoft.com/office/powerpoint/2010/main" val="1469761683"/>
       </p:ext>
     </p:extLst>
   </p:cSld>
@@ -22473,6 +22582,122 @@
       </p:grpSpPr>
       <p:sp>
         <p:nvSpPr>
+          <p:cNvPr id="2" name="Content Placeholder 1"/>
+          <p:cNvSpPr>
+            <a:spLocks noGrp="1"/>
+          </p:cNvSpPr>
+          <p:nvPr>
+            <p:ph idx="1"/>
+          </p:nvPr>
+        </p:nvSpPr>
+        <p:spPr/>
+        <p:txBody>
+          <a:bodyPr/>
+          <a:lstStyle/>
+          <a:p>
+            <a:pPr marL="342900" indent="-342900">
+              <a:buAutoNum type="arabicPeriod"/>
+            </a:pPr>
+            <a:r>
+              <a:rPr lang="en-US" sz="1800" dirty="0" smtClean="0"/>
+              <a:t>Overall LCA </a:t>
+            </a:r>
+          </a:p>
+          <a:p>
+            <a:pPr marL="342900" indent="-342900">
+              <a:buAutoNum type="arabicPeriod"/>
+            </a:pPr>
+            <a:r>
+              <a:rPr lang="en-US" sz="1800" dirty="0" smtClean="0"/>
+              <a:t>Embodied </a:t>
+            </a:r>
+            <a:r>
+              <a:rPr lang="en-US" sz="1800" dirty="0"/>
+              <a:t>emissions</a:t>
+            </a:r>
+          </a:p>
+          <a:p>
+            <a:pPr lvl="1"/>
+            <a:r>
+              <a:rPr lang="en-US" sz="1800" dirty="0"/>
+              <a:t>Components of the building </a:t>
+            </a:r>
+          </a:p>
+          <a:p>
+            <a:pPr lvl="1"/>
+            <a:r>
+              <a:rPr lang="en-US" sz="1800" dirty="0"/>
+              <a:t>+ Transportation</a:t>
+            </a:r>
+          </a:p>
+          <a:p>
+            <a:pPr lvl="2"/>
+            <a:r>
+              <a:rPr lang="en-US" sz="1600" dirty="0"/>
+              <a:t>as assumed by Viola - lorry transportation of local and not local material till the building site)</a:t>
+            </a:r>
+            <a:endParaRPr lang="en-US" sz="1800" dirty="0" smtClean="0"/>
+          </a:p>
+          <a:p>
+            <a:pPr marL="342900" indent="-342900">
+              <a:buAutoNum type="arabicPeriod"/>
+            </a:pPr>
+            <a:r>
+              <a:rPr lang="en-US" sz="1800" dirty="0" smtClean="0"/>
+              <a:t>Operational emissions</a:t>
+            </a:r>
+          </a:p>
+          <a:p>
+            <a:pPr lvl="1"/>
+            <a:r>
+              <a:rPr lang="en-US" sz="1800" dirty="0"/>
+              <a:t>Space heating</a:t>
+            </a:r>
+          </a:p>
+          <a:p>
+            <a:pPr lvl="1"/>
+            <a:r>
+              <a:rPr lang="en-US" sz="1800" dirty="0"/>
+              <a:t>Ventilation </a:t>
+            </a:r>
+          </a:p>
+          <a:p>
+            <a:pPr lvl="1"/>
+            <a:r>
+              <a:rPr lang="en-US" sz="1800" dirty="0" smtClean="0"/>
+              <a:t>+ Hot water</a:t>
+            </a:r>
+          </a:p>
+          <a:p>
+            <a:pPr lvl="2"/>
+            <a:r>
+              <a:rPr lang="en-US" sz="1600" dirty="0" smtClean="0"/>
+              <a:t>directly associated to the reported values of hot water usage)</a:t>
+            </a:r>
+          </a:p>
+          <a:p>
+            <a:pPr lvl="1"/>
+            <a:r>
+              <a:rPr lang="en-US" sz="1800" dirty="0" smtClean="0"/>
+              <a:t>+ Electricity </a:t>
+            </a:r>
+          </a:p>
+          <a:p>
+            <a:pPr lvl="2"/>
+            <a:r>
+              <a:rPr lang="en-US" sz="1600" dirty="0" smtClean="0"/>
+              <a:t>as assumed by viola based on occupancy)</a:t>
+            </a:r>
+            <a:endParaRPr lang="en-US" sz="1800" dirty="0" smtClean="0"/>
+          </a:p>
+          <a:p>
+            <a:pPr lvl="1"/>
+            <a:endParaRPr lang="en-US" sz="1800" dirty="0"/>
+          </a:p>
+        </p:txBody>
+      </p:sp>
+      <p:sp>
+        <p:nvSpPr>
           <p:cNvPr id="3" name="Date Placeholder 2"/>
           <p:cNvSpPr>
             <a:spLocks noGrp="1"/>
@@ -22557,73 +22782,16 @@
           <a:p>
             <a:r>
               <a:rPr lang="en-US" dirty="0" smtClean="0"/>
-              <a:t>1. Overall LCA - Embodied and </a:t>
+              <a:t>LCA extensions</a:t>
             </a:r>
-            <a:r>
-              <a:rPr lang="en-US" dirty="0"/>
-              <a:t>operational (Example building)</a:t>
-            </a:r>
-          </a:p>
-        </p:txBody>
-      </p:sp>
-      <p:graphicFrame>
-        <p:nvGraphicFramePr>
-          <p:cNvPr id="10" name="Chart 9"/>
-          <p:cNvGraphicFramePr>
-            <a:graphicFrameLocks/>
-          </p:cNvGraphicFramePr>
-          <p:nvPr>
-            <p:extLst>
-              <p:ext uri="{D42A27DB-BD31-4B8C-83A1-F6EECF244321}">
-                <p14:modId xmlns:p14="http://schemas.microsoft.com/office/powerpoint/2010/main" val="1547022581"/>
-              </p:ext>
-            </p:extLst>
-          </p:nvPr>
-        </p:nvGraphicFramePr>
-        <p:xfrm>
-          <a:off x="521678" y="2057399"/>
-          <a:ext cx="8104674" cy="3399693"/>
-        </p:xfrm>
-        <a:graphic>
-          <a:graphicData uri="http://schemas.openxmlformats.org/drawingml/2006/chart">
-            <c:chart xmlns:c="http://schemas.openxmlformats.org/drawingml/2006/chart" xmlns:r="http://schemas.openxmlformats.org/officeDocument/2006/relationships" r:id="rId3"/>
-          </a:graphicData>
-        </a:graphic>
-      </p:graphicFrame>
-      <p:sp>
-        <p:nvSpPr>
-          <p:cNvPr id="11" name="TextBox 10"/>
-          <p:cNvSpPr txBox="1"/>
-          <p:nvPr/>
-        </p:nvSpPr>
-        <p:spPr>
-          <a:xfrm>
-            <a:off x="2702169" y="5726723"/>
-            <a:ext cx="4185761" cy="369332"/>
-          </a:xfrm>
-          <a:prstGeom prst="rect">
-            <a:avLst/>
-          </a:prstGeom>
-          <a:noFill/>
-        </p:spPr>
-        <p:txBody>
-          <a:bodyPr wrap="none" rtlCol="0">
-            <a:spAutoFit/>
-          </a:bodyPr>
-          <a:lstStyle/>
-          <a:p>
-            <a:r>
-              <a:rPr lang="en-US" i="1" dirty="0" smtClean="0"/>
-              <a:t>Results on paper will show all buildings</a:t>
-            </a:r>
-            <a:endParaRPr lang="en-US" i="1" dirty="0"/>
+            <a:endParaRPr lang="en-US" dirty="0"/>
           </a:p>
         </p:txBody>
       </p:sp>
     </p:spTree>
     <p:extLst>
       <p:ext uri="{BB962C8B-B14F-4D97-AF65-F5344CB8AC3E}">
-        <p14:creationId xmlns:p14="http://schemas.microsoft.com/office/powerpoint/2010/main" val="4030856589"/>
+        <p14:creationId xmlns:p14="http://schemas.microsoft.com/office/powerpoint/2010/main" val="2135928578"/>
       </p:ext>
     </p:extLst>
   </p:cSld>
@@ -22633,6 +22801,13 @@
   <p:transition>
     <p:fade/>
   </p:transition>
+  <p:timing>
+    <p:tnLst>
+      <p:par>
+        <p:cTn id="1" dur="indefinite" restart="never" nodeType="tmRoot"/>
+      </p:par>
+    </p:tnLst>
+  </p:timing>
 </p:sld>
 </file>
 

</xml_diff>

<commit_message>
SI and heating demands
</commit_message>
<xml_diff>
--- a/paper_SI_discussions/Discussion_paper.pptx
+++ b/paper_SI_discussions/Discussion_paper.pptx
@@ -21718,7 +21718,7 @@
             <p:ph idx="1"/>
             <p:extLst>
               <p:ext uri="{D42A27DB-BD31-4B8C-83A1-F6EECF244321}">
-                <p14:modId xmlns:p14="http://schemas.microsoft.com/office/powerpoint/2010/main" val="3174084599"/>
+                <p14:modId xmlns:p14="http://schemas.microsoft.com/office/powerpoint/2010/main" val="3440396077"/>
               </p:ext>
             </p:extLst>
           </p:nvPr>
@@ -22011,7 +22011,7 @@
                       <a:prstDash val="solid"/>
                     </a:lnBlToTr>
                     <a:solidFill>
-                      <a:srgbClr val="D5D7CC"/>
+                      <a:srgbClr val="92D050"/>
                     </a:solidFill>
                   </a:tcPr>
                 </a:tc>
@@ -22362,11 +22362,7 @@
                       </a:r>
                       <a:r>
                         <a:rPr lang="en-US" sz="1200" baseline="0" dirty="0" smtClean="0"/>
-                        <a:t>Write </a:t>
-                      </a:r>
-                      <a:r>
-                        <a:rPr lang="en-US" sz="1200" baseline="0" dirty="0" smtClean="0"/>
-                        <a:t>Section 5.4 Scenarios</a:t>
+                        <a:t>Write Section 5.4 Scenarios</a:t>
                       </a:r>
                     </a:p>
                   </a:txBody>

</xml_diff>